<commit_message>
add internal design to spec
</commit_message>
<xml_diff>
--- a/adhafera/interface/register.pptx
+++ b/adhafera/interface/register.pptx
@@ -193,7 +193,7 @@
           <a:p>
             <a:fld id="{EE82FEE5-269B-9B49-A8C4-823C45BE6055}" type="datetimeFigureOut">
               <a:rPr kumimoji="1" lang="ja-JP" altLang="en-US" smtClean="0"/>
-              <a:t>15/07/12</a:t>
+              <a:t>15/11/02</a:t>
             </a:fld>
             <a:endParaRPr kumimoji="1" lang="ja-JP" altLang="en-US"/>
           </a:p>
@@ -758,7 +758,7 @@
           <a:p>
             <a:fld id="{3ABA01A1-4899-9944-833D-6A66CDE659CB}" type="datetimeFigureOut">
               <a:rPr kumimoji="1" lang="ja-JP" altLang="en-US" smtClean="0"/>
-              <a:t>15/07/12</a:t>
+              <a:t>15/11/02</a:t>
             </a:fld>
             <a:endParaRPr kumimoji="1" lang="ja-JP" altLang="en-US"/>
           </a:p>
@@ -960,7 +960,7 @@
           <a:p>
             <a:fld id="{3ABA01A1-4899-9944-833D-6A66CDE659CB}" type="datetimeFigureOut">
               <a:rPr kumimoji="1" lang="ja-JP" altLang="en-US" smtClean="0"/>
-              <a:t>15/07/12</a:t>
+              <a:t>15/11/02</a:t>
             </a:fld>
             <a:endParaRPr kumimoji="1" lang="ja-JP" altLang="en-US"/>
           </a:p>
@@ -1172,7 +1172,7 @@
           <a:p>
             <a:fld id="{3ABA01A1-4899-9944-833D-6A66CDE659CB}" type="datetimeFigureOut">
               <a:rPr kumimoji="1" lang="ja-JP" altLang="en-US" smtClean="0"/>
-              <a:t>15/07/12</a:t>
+              <a:t>15/11/02</a:t>
             </a:fld>
             <a:endParaRPr kumimoji="1" lang="ja-JP" altLang="en-US"/>
           </a:p>
@@ -1374,7 +1374,7 @@
           <a:p>
             <a:fld id="{3ABA01A1-4899-9944-833D-6A66CDE659CB}" type="datetimeFigureOut">
               <a:rPr kumimoji="1" lang="ja-JP" altLang="en-US" smtClean="0"/>
-              <a:t>15/07/12</a:t>
+              <a:t>15/11/02</a:t>
             </a:fld>
             <a:endParaRPr kumimoji="1" lang="ja-JP" altLang="en-US"/>
           </a:p>
@@ -1620,7 +1620,7 @@
           <a:p>
             <a:fld id="{3ABA01A1-4899-9944-833D-6A66CDE659CB}" type="datetimeFigureOut">
               <a:rPr kumimoji="1" lang="ja-JP" altLang="en-US" smtClean="0"/>
-              <a:t>15/07/12</a:t>
+              <a:t>15/11/02</a:t>
             </a:fld>
             <a:endParaRPr kumimoji="1" lang="ja-JP" altLang="en-US"/>
           </a:p>
@@ -1972,7 +1972,7 @@
           <a:p>
             <a:fld id="{3ABA01A1-4899-9944-833D-6A66CDE659CB}" type="datetimeFigureOut">
               <a:rPr kumimoji="1" lang="ja-JP" altLang="en-US" smtClean="0"/>
-              <a:t>15/07/12</a:t>
+              <a:t>15/11/02</a:t>
             </a:fld>
             <a:endParaRPr kumimoji="1" lang="ja-JP" altLang="en-US"/>
           </a:p>
@@ -2458,7 +2458,7 @@
           <a:p>
             <a:fld id="{3ABA01A1-4899-9944-833D-6A66CDE659CB}" type="datetimeFigureOut">
               <a:rPr kumimoji="1" lang="ja-JP" altLang="en-US" smtClean="0"/>
-              <a:t>15/07/12</a:t>
+              <a:t>15/11/02</a:t>
             </a:fld>
             <a:endParaRPr kumimoji="1" lang="ja-JP" altLang="en-US"/>
           </a:p>
@@ -2576,7 +2576,7 @@
           <a:p>
             <a:fld id="{3ABA01A1-4899-9944-833D-6A66CDE659CB}" type="datetimeFigureOut">
               <a:rPr kumimoji="1" lang="ja-JP" altLang="en-US" smtClean="0"/>
-              <a:t>15/07/12</a:t>
+              <a:t>15/11/02</a:t>
             </a:fld>
             <a:endParaRPr kumimoji="1" lang="ja-JP" altLang="en-US"/>
           </a:p>
@@ -2671,7 +2671,7 @@
           <a:p>
             <a:fld id="{3ABA01A1-4899-9944-833D-6A66CDE659CB}" type="datetimeFigureOut">
               <a:rPr kumimoji="1" lang="ja-JP" altLang="en-US" smtClean="0"/>
-              <a:t>15/07/12</a:t>
+              <a:t>15/11/02</a:t>
             </a:fld>
             <a:endParaRPr kumimoji="1" lang="ja-JP" altLang="en-US"/>
           </a:p>
@@ -2980,7 +2980,7 @@
           <a:p>
             <a:fld id="{3ABA01A1-4899-9944-833D-6A66CDE659CB}" type="datetimeFigureOut">
               <a:rPr kumimoji="1" lang="ja-JP" altLang="en-US" smtClean="0"/>
-              <a:t>15/07/12</a:t>
+              <a:t>15/11/02</a:t>
             </a:fld>
             <a:endParaRPr kumimoji="1" lang="ja-JP" altLang="en-US"/>
           </a:p>
@@ -3233,7 +3233,7 @@
           <a:p>
             <a:fld id="{3ABA01A1-4899-9944-833D-6A66CDE659CB}" type="datetimeFigureOut">
               <a:rPr kumimoji="1" lang="ja-JP" altLang="en-US" smtClean="0"/>
-              <a:t>15/07/12</a:t>
+              <a:t>15/11/02</a:t>
             </a:fld>
             <a:endParaRPr kumimoji="1" lang="ja-JP" altLang="en-US"/>
           </a:p>
@@ -3478,7 +3478,7 @@
           <a:p>
             <a:fld id="{3ABA01A1-4899-9944-833D-6A66CDE659CB}" type="datetimeFigureOut">
               <a:rPr kumimoji="1" lang="ja-JP" altLang="en-US" smtClean="0"/>
-              <a:t>15/07/12</a:t>
+              <a:t>15/11/02</a:t>
             </a:fld>
             <a:endParaRPr kumimoji="1" lang="ja-JP" altLang="en-US"/>
           </a:p>
@@ -3877,11 +3877,7 @@
           <a:p>
             <a:r>
               <a:rPr kumimoji="1" lang="ja-JP" altLang="en-US" dirty="0" smtClean="0"/>
-              <a:t>家計簿</a:t>
-            </a:r>
-            <a:r>
-              <a:rPr kumimoji="1" lang="ja-JP" altLang="en-US" dirty="0" smtClean="0"/>
-              <a:t>プログラム</a:t>
+              <a:t>家計簿プログラム</a:t>
             </a:r>
             <a:r>
               <a:rPr kumimoji="1" lang="en-US" altLang="ja-JP" dirty="0" smtClean="0"/>
@@ -3918,11 +3914,19 @@
             </a:r>
             <a:r>
               <a:rPr lang="en-US" altLang="ja-JP" sz="2800" dirty="0" smtClean="0"/>
-              <a:t>2015/</a:t>
+              <a:t>2015</a:t>
             </a:r>
             <a:r>
               <a:rPr lang="en-US" altLang="ja-JP" sz="2800" dirty="0" smtClean="0"/>
-              <a:t>07/12</a:t>
+              <a:t>/</a:t>
+            </a:r>
+            <a:r>
+              <a:rPr lang="en-US" altLang="ja-JP" sz="2800" dirty="0" smtClean="0"/>
+              <a:t>11</a:t>
+            </a:r>
+            <a:r>
+              <a:rPr lang="en-US" altLang="ja-JP" sz="2800" dirty="0" smtClean="0"/>
+              <a:t>/02</a:t>
             </a:r>
             <a:r>
               <a:rPr lang="en-US" altLang="ja-JP" sz="2800" dirty="0" smtClean="0"/>
@@ -4009,15 +4013,7 @@
                 <a:ea typeface="メイリオ"/>
                 <a:cs typeface="メイリオ"/>
               </a:rPr>
-              <a:t>登録</a:t>
-            </a:r>
-            <a:r>
-              <a:rPr lang="ja-JP" altLang="en-US" sz="2800" dirty="0" smtClean="0">
-                <a:latin typeface="メイリオ"/>
-                <a:ea typeface="メイリオ"/>
-                <a:cs typeface="メイリオ"/>
-              </a:rPr>
-              <a:t>画面</a:t>
+              <a:t>登録画面</a:t>
             </a:r>
             <a:endParaRPr kumimoji="1" lang="ja-JP" altLang="en-US" sz="2000" dirty="0">
               <a:latin typeface="メイリオ"/>
@@ -4027,801 +4023,816 @@
           </a:p>
         </p:txBody>
       </p:sp>
-      <p:sp>
-        <p:nvSpPr>
-          <p:cNvPr id="5" name="正方形/長方形 4"/>
-          <p:cNvSpPr/>
+      <p:grpSp>
+        <p:nvGrpSpPr>
+          <p:cNvPr id="2" name="図形グループ 1"/>
+          <p:cNvGrpSpPr/>
           <p:nvPr/>
-        </p:nvSpPr>
-        <p:spPr>
+        </p:nvGrpSpPr>
+        <p:grpSpPr>
           <a:xfrm>
             <a:off x="2399632" y="815476"/>
             <a:ext cx="4130842" cy="5788523"/>
+            <a:chOff x="2399632" y="815476"/>
+            <a:chExt cx="4130842" cy="5788523"/>
           </a:xfrm>
-          <a:prstGeom prst="rect">
-            <a:avLst/>
-          </a:prstGeom>
-          <a:noFill/>
-          <a:ln w="25400">
-            <a:solidFill>
-              <a:schemeClr val="tx1"/>
-            </a:solidFill>
-          </a:ln>
-          <a:effectLst/>
-        </p:spPr>
-        <p:style>
-          <a:lnRef idx="1">
-            <a:schemeClr val="accent1"/>
-          </a:lnRef>
-          <a:fillRef idx="3">
-            <a:schemeClr val="accent1"/>
-          </a:fillRef>
-          <a:effectRef idx="2">
-            <a:schemeClr val="accent1"/>
-          </a:effectRef>
-          <a:fontRef idx="minor">
-            <a:schemeClr val="lt1"/>
-          </a:fontRef>
-        </p:style>
-        <p:txBody>
-          <a:bodyPr rtlCol="0" anchor="ctr"/>
-          <a:lstStyle/>
-          <a:p>
-            <a:pPr algn="ctr"/>
-            <a:endParaRPr kumimoji="1" lang="ja-JP" altLang="en-US" sz="2800" dirty="0">
+        </p:grpSpPr>
+        <p:sp>
+          <p:nvSpPr>
+            <p:cNvPr id="5" name="正方形/長方形 4"/>
+            <p:cNvSpPr/>
+            <p:nvPr/>
+          </p:nvSpPr>
+          <p:spPr>
+            <a:xfrm>
+              <a:off x="2399632" y="815476"/>
+              <a:ext cx="4130842" cy="5788523"/>
+            </a:xfrm>
+            <a:prstGeom prst="rect">
+              <a:avLst/>
+            </a:prstGeom>
+            <a:noFill/>
+            <a:ln w="25400">
               <a:solidFill>
                 <a:schemeClr val="tx1"/>
               </a:solidFill>
-              <a:latin typeface="メイリオ"/>
-              <a:ea typeface="メイリオ"/>
-              <a:cs typeface="メイリオ"/>
-            </a:endParaRPr>
-          </a:p>
-        </p:txBody>
-      </p:sp>
-      <p:sp>
-        <p:nvSpPr>
-          <p:cNvPr id="13" name="テキスト ボックス 12"/>
-          <p:cNvSpPr txBox="1"/>
-          <p:nvPr/>
-        </p:nvSpPr>
-        <p:spPr>
-          <a:xfrm>
-            <a:off x="3041515" y="1295947"/>
-            <a:ext cx="877163" cy="369332"/>
-          </a:xfrm>
-          <a:prstGeom prst="rect">
-            <a:avLst/>
-          </a:prstGeom>
-          <a:noFill/>
-          <a:ln>
-            <a:noFill/>
-          </a:ln>
-        </p:spPr>
-        <p:txBody>
-          <a:bodyPr wrap="none" rtlCol="0">
-            <a:spAutoFit/>
-          </a:bodyPr>
-          <a:lstStyle/>
-          <a:p>
-            <a:r>
-              <a:rPr kumimoji="1" lang="ja-JP" altLang="en-US" dirty="0" smtClean="0">
-                <a:latin typeface="メイリオ"/>
-                <a:ea typeface="メイリオ"/>
-                <a:cs typeface="メイリオ"/>
-              </a:rPr>
-              <a:t>日付：</a:t>
-            </a:r>
-            <a:endParaRPr kumimoji="1" lang="ja-JP" altLang="en-US" dirty="0">
-              <a:latin typeface="メイリオ"/>
-              <a:ea typeface="メイリオ"/>
-              <a:cs typeface="メイリオ"/>
-            </a:endParaRPr>
-          </a:p>
-        </p:txBody>
-      </p:sp>
-      <p:sp>
-        <p:nvSpPr>
-          <p:cNvPr id="14" name="テキスト ボックス 13"/>
-          <p:cNvSpPr txBox="1"/>
-          <p:nvPr/>
-        </p:nvSpPr>
-        <p:spPr>
-          <a:xfrm>
-            <a:off x="3041515" y="1811337"/>
-            <a:ext cx="877163" cy="369332"/>
-          </a:xfrm>
-          <a:prstGeom prst="rect">
-            <a:avLst/>
-          </a:prstGeom>
-          <a:noFill/>
-          <a:ln>
-            <a:noFill/>
-          </a:ln>
-        </p:spPr>
-        <p:txBody>
-          <a:bodyPr wrap="none" rtlCol="0">
-            <a:spAutoFit/>
-          </a:bodyPr>
-          <a:lstStyle/>
-          <a:p>
-            <a:r>
-              <a:rPr lang="ja-JP" altLang="en-US" dirty="0" smtClean="0">
-                <a:latin typeface="メイリオ"/>
-                <a:ea typeface="メイリオ"/>
-                <a:cs typeface="メイリオ"/>
-              </a:rPr>
-              <a:t>内容</a:t>
-            </a:r>
-            <a:r>
-              <a:rPr kumimoji="1" lang="ja-JP" altLang="en-US" dirty="0" smtClean="0">
-                <a:latin typeface="メイリオ"/>
-                <a:ea typeface="メイリオ"/>
-                <a:cs typeface="メイリオ"/>
-              </a:rPr>
-              <a:t>：</a:t>
-            </a:r>
-            <a:endParaRPr kumimoji="1" lang="ja-JP" altLang="en-US" dirty="0">
-              <a:latin typeface="メイリオ"/>
-              <a:ea typeface="メイリオ"/>
-              <a:cs typeface="メイリオ"/>
-            </a:endParaRPr>
-          </a:p>
-        </p:txBody>
-      </p:sp>
-      <p:sp>
-        <p:nvSpPr>
-          <p:cNvPr id="15" name="テキスト ボックス 14"/>
-          <p:cNvSpPr txBox="1"/>
-          <p:nvPr/>
-        </p:nvSpPr>
-        <p:spPr>
-          <a:xfrm>
-            <a:off x="2579850" y="2326727"/>
-            <a:ext cx="1338828" cy="369332"/>
-          </a:xfrm>
-          <a:prstGeom prst="rect">
-            <a:avLst/>
-          </a:prstGeom>
-          <a:noFill/>
-          <a:ln>
-            <a:noFill/>
-          </a:ln>
-        </p:spPr>
-        <p:txBody>
-          <a:bodyPr wrap="none" rtlCol="0">
-            <a:spAutoFit/>
-          </a:bodyPr>
-          <a:lstStyle/>
-          <a:p>
-            <a:r>
-              <a:rPr lang="ja-JP" altLang="en-US" dirty="0" smtClean="0">
-                <a:latin typeface="メイリオ"/>
-                <a:ea typeface="メイリオ"/>
-                <a:cs typeface="メイリオ"/>
-              </a:rPr>
-              <a:t>カテゴリ</a:t>
-            </a:r>
-            <a:r>
-              <a:rPr kumimoji="1" lang="ja-JP" altLang="en-US" dirty="0" smtClean="0">
-                <a:latin typeface="メイリオ"/>
-                <a:ea typeface="メイリオ"/>
-                <a:cs typeface="メイリオ"/>
-              </a:rPr>
-              <a:t>：</a:t>
-            </a:r>
-            <a:endParaRPr kumimoji="1" lang="ja-JP" altLang="en-US" dirty="0">
-              <a:latin typeface="メイリオ"/>
-              <a:ea typeface="メイリオ"/>
-              <a:cs typeface="メイリオ"/>
-            </a:endParaRPr>
-          </a:p>
-        </p:txBody>
-      </p:sp>
-      <p:sp>
-        <p:nvSpPr>
-          <p:cNvPr id="16" name="テキスト ボックス 15"/>
-          <p:cNvSpPr txBox="1"/>
-          <p:nvPr/>
-        </p:nvSpPr>
-        <p:spPr>
-          <a:xfrm>
-            <a:off x="3041515" y="2842117"/>
-            <a:ext cx="877163" cy="369332"/>
-          </a:xfrm>
-          <a:prstGeom prst="rect">
-            <a:avLst/>
-          </a:prstGeom>
-          <a:noFill/>
-          <a:ln>
-            <a:noFill/>
-          </a:ln>
-        </p:spPr>
-        <p:txBody>
-          <a:bodyPr wrap="none" rtlCol="0">
-            <a:spAutoFit/>
-          </a:bodyPr>
-          <a:lstStyle/>
-          <a:p>
-            <a:r>
-              <a:rPr lang="ja-JP" altLang="en-US" dirty="0" smtClean="0">
-                <a:latin typeface="メイリオ"/>
-                <a:ea typeface="メイリオ"/>
-                <a:cs typeface="メイリオ"/>
-              </a:rPr>
-              <a:t>金額</a:t>
-            </a:r>
-            <a:r>
-              <a:rPr kumimoji="1" lang="ja-JP" altLang="en-US" dirty="0" smtClean="0">
-                <a:latin typeface="メイリオ"/>
-                <a:ea typeface="メイリオ"/>
-                <a:cs typeface="メイリオ"/>
-              </a:rPr>
-              <a:t>：</a:t>
-            </a:r>
-            <a:endParaRPr kumimoji="1" lang="ja-JP" altLang="en-US" dirty="0">
-              <a:latin typeface="メイリオ"/>
-              <a:ea typeface="メイリオ"/>
-              <a:cs typeface="メイリオ"/>
-            </a:endParaRPr>
-          </a:p>
-        </p:txBody>
-      </p:sp>
-      <p:sp>
-        <p:nvSpPr>
-          <p:cNvPr id="17" name="テキスト ボックス 16"/>
-          <p:cNvSpPr txBox="1"/>
-          <p:nvPr/>
-        </p:nvSpPr>
-        <p:spPr>
-          <a:xfrm>
-            <a:off x="2579850" y="3357507"/>
-            <a:ext cx="1338828" cy="369332"/>
-          </a:xfrm>
-          <a:prstGeom prst="rect">
-            <a:avLst/>
-          </a:prstGeom>
-          <a:noFill/>
-          <a:ln>
-            <a:noFill/>
-          </a:ln>
-        </p:spPr>
-        <p:txBody>
-          <a:bodyPr wrap="none" rtlCol="0">
-            <a:spAutoFit/>
-          </a:bodyPr>
-          <a:lstStyle/>
-          <a:p>
-            <a:r>
-              <a:rPr lang="en-US" altLang="en-US" dirty="0" smtClean="0">
-                <a:latin typeface="メイリオ"/>
-                <a:ea typeface="メイリオ"/>
-                <a:cs typeface="メイリオ"/>
-              </a:rPr>
-              <a:t>テーブル</a:t>
-            </a:r>
-            <a:r>
-              <a:rPr kumimoji="1" lang="ja-JP" altLang="en-US" dirty="0" smtClean="0">
-                <a:latin typeface="メイリオ"/>
-                <a:ea typeface="メイリオ"/>
-                <a:cs typeface="メイリオ"/>
-              </a:rPr>
-              <a:t>：</a:t>
-            </a:r>
-            <a:endParaRPr kumimoji="1" lang="ja-JP" altLang="en-US" dirty="0">
-              <a:latin typeface="メイリオ"/>
-              <a:ea typeface="メイリオ"/>
-              <a:cs typeface="メイリオ"/>
-            </a:endParaRPr>
-          </a:p>
-        </p:txBody>
-      </p:sp>
-      <p:sp>
-        <p:nvSpPr>
-          <p:cNvPr id="18" name="角丸四角形 17"/>
-          <p:cNvSpPr/>
-          <p:nvPr/>
-        </p:nvSpPr>
-        <p:spPr>
-          <a:xfrm>
-            <a:off x="3041515" y="5982125"/>
-            <a:ext cx="1243263" cy="360947"/>
-          </a:xfrm>
-          <a:prstGeom prst="roundRect">
-            <a:avLst/>
-          </a:prstGeom>
-          <a:noFill/>
-          <a:ln w="25400">
-            <a:solidFill>
-              <a:schemeClr val="tx1"/>
-            </a:solidFill>
-          </a:ln>
-          <a:effectLst/>
-        </p:spPr>
-        <p:style>
-          <a:lnRef idx="1">
-            <a:schemeClr val="accent1"/>
-          </a:lnRef>
-          <a:fillRef idx="3">
-            <a:schemeClr val="accent1"/>
-          </a:fillRef>
-          <a:effectRef idx="2">
-            <a:schemeClr val="accent1"/>
-          </a:effectRef>
-          <a:fontRef idx="minor">
-            <a:schemeClr val="lt1"/>
-          </a:fontRef>
-        </p:style>
-        <p:txBody>
-          <a:bodyPr rtlCol="0" anchor="ctr"/>
-          <a:lstStyle/>
-          <a:p>
-            <a:pPr algn="ctr"/>
-            <a:r>
-              <a:rPr lang="ja-JP" altLang="en-US" dirty="0" smtClean="0">
+            </a:ln>
+            <a:effectLst/>
+          </p:spPr>
+          <p:style>
+            <a:lnRef idx="1">
+              <a:schemeClr val="accent1"/>
+            </a:lnRef>
+            <a:fillRef idx="3">
+              <a:schemeClr val="accent1"/>
+            </a:fillRef>
+            <a:effectRef idx="2">
+              <a:schemeClr val="accent1"/>
+            </a:effectRef>
+            <a:fontRef idx="minor">
+              <a:schemeClr val="lt1"/>
+            </a:fontRef>
+          </p:style>
+          <p:txBody>
+            <a:bodyPr rtlCol="0" anchor="ctr"/>
+            <a:lstStyle/>
+            <a:p>
+              <a:pPr algn="ctr"/>
+              <a:endParaRPr kumimoji="1" lang="ja-JP" altLang="en-US" sz="2800" dirty="0">
                 <a:solidFill>
                   <a:schemeClr val="tx1"/>
                 </a:solidFill>
                 <a:latin typeface="メイリオ"/>
                 <a:ea typeface="メイリオ"/>
                 <a:cs typeface="メイリオ"/>
-              </a:rPr>
-              <a:t>登録</a:t>
-            </a:r>
-            <a:endParaRPr lang="en-US" altLang="ja-JP" dirty="0" smtClean="0">
+              </a:endParaRPr>
+            </a:p>
+          </p:txBody>
+        </p:sp>
+        <p:sp>
+          <p:nvSpPr>
+            <p:cNvPr id="13" name="テキスト ボックス 12"/>
+            <p:cNvSpPr txBox="1"/>
+            <p:nvPr/>
+          </p:nvSpPr>
+          <p:spPr>
+            <a:xfrm>
+              <a:off x="3041515" y="1295947"/>
+              <a:ext cx="877163" cy="369332"/>
+            </a:xfrm>
+            <a:prstGeom prst="rect">
+              <a:avLst/>
+            </a:prstGeom>
+            <a:noFill/>
+            <a:ln>
+              <a:noFill/>
+            </a:ln>
+          </p:spPr>
+          <p:txBody>
+            <a:bodyPr wrap="none" rtlCol="0">
+              <a:spAutoFit/>
+            </a:bodyPr>
+            <a:lstStyle/>
+            <a:p>
+              <a:r>
+                <a:rPr kumimoji="1" lang="ja-JP" altLang="en-US" dirty="0" smtClean="0">
+                  <a:latin typeface="メイリオ"/>
+                  <a:ea typeface="メイリオ"/>
+                  <a:cs typeface="メイリオ"/>
+                </a:rPr>
+                <a:t>日付：</a:t>
+              </a:r>
+              <a:endParaRPr kumimoji="1" lang="ja-JP" altLang="en-US" dirty="0">
+                <a:latin typeface="メイリオ"/>
+                <a:ea typeface="メイリオ"/>
+                <a:cs typeface="メイリオ"/>
+              </a:endParaRPr>
+            </a:p>
+          </p:txBody>
+        </p:sp>
+        <p:sp>
+          <p:nvSpPr>
+            <p:cNvPr id="14" name="テキスト ボックス 13"/>
+            <p:cNvSpPr txBox="1"/>
+            <p:nvPr/>
+          </p:nvSpPr>
+          <p:spPr>
+            <a:xfrm>
+              <a:off x="3041515" y="1811337"/>
+              <a:ext cx="877163" cy="369332"/>
+            </a:xfrm>
+            <a:prstGeom prst="rect">
+              <a:avLst/>
+            </a:prstGeom>
+            <a:noFill/>
+            <a:ln>
+              <a:noFill/>
+            </a:ln>
+          </p:spPr>
+          <p:txBody>
+            <a:bodyPr wrap="none" rtlCol="0">
+              <a:spAutoFit/>
+            </a:bodyPr>
+            <a:lstStyle/>
+            <a:p>
+              <a:r>
+                <a:rPr lang="ja-JP" altLang="en-US" dirty="0" smtClean="0">
+                  <a:latin typeface="メイリオ"/>
+                  <a:ea typeface="メイリオ"/>
+                  <a:cs typeface="メイリオ"/>
+                </a:rPr>
+                <a:t>内容</a:t>
+              </a:r>
+              <a:r>
+                <a:rPr kumimoji="1" lang="ja-JP" altLang="en-US" dirty="0" smtClean="0">
+                  <a:latin typeface="メイリオ"/>
+                  <a:ea typeface="メイリオ"/>
+                  <a:cs typeface="メイリオ"/>
+                </a:rPr>
+                <a:t>：</a:t>
+              </a:r>
+              <a:endParaRPr kumimoji="1" lang="ja-JP" altLang="en-US" dirty="0">
+                <a:latin typeface="メイリオ"/>
+                <a:ea typeface="メイリオ"/>
+                <a:cs typeface="メイリオ"/>
+              </a:endParaRPr>
+            </a:p>
+          </p:txBody>
+        </p:sp>
+        <p:sp>
+          <p:nvSpPr>
+            <p:cNvPr id="15" name="テキスト ボックス 14"/>
+            <p:cNvSpPr txBox="1"/>
+            <p:nvPr/>
+          </p:nvSpPr>
+          <p:spPr>
+            <a:xfrm>
+              <a:off x="2579850" y="2326727"/>
+              <a:ext cx="1338828" cy="369332"/>
+            </a:xfrm>
+            <a:prstGeom prst="rect">
+              <a:avLst/>
+            </a:prstGeom>
+            <a:noFill/>
+            <a:ln>
+              <a:noFill/>
+            </a:ln>
+          </p:spPr>
+          <p:txBody>
+            <a:bodyPr wrap="none" rtlCol="0">
+              <a:spAutoFit/>
+            </a:bodyPr>
+            <a:lstStyle/>
+            <a:p>
+              <a:r>
+                <a:rPr lang="ja-JP" altLang="en-US" dirty="0" smtClean="0">
+                  <a:latin typeface="メイリオ"/>
+                  <a:ea typeface="メイリオ"/>
+                  <a:cs typeface="メイリオ"/>
+                </a:rPr>
+                <a:t>カテゴリ</a:t>
+              </a:r>
+              <a:r>
+                <a:rPr kumimoji="1" lang="ja-JP" altLang="en-US" dirty="0" smtClean="0">
+                  <a:latin typeface="メイリオ"/>
+                  <a:ea typeface="メイリオ"/>
+                  <a:cs typeface="メイリオ"/>
+                </a:rPr>
+                <a:t>：</a:t>
+              </a:r>
+              <a:endParaRPr kumimoji="1" lang="ja-JP" altLang="en-US" dirty="0">
+                <a:latin typeface="メイリオ"/>
+                <a:ea typeface="メイリオ"/>
+                <a:cs typeface="メイリオ"/>
+              </a:endParaRPr>
+            </a:p>
+          </p:txBody>
+        </p:sp>
+        <p:sp>
+          <p:nvSpPr>
+            <p:cNvPr id="16" name="テキスト ボックス 15"/>
+            <p:cNvSpPr txBox="1"/>
+            <p:nvPr/>
+          </p:nvSpPr>
+          <p:spPr>
+            <a:xfrm>
+              <a:off x="3041515" y="2842117"/>
+              <a:ext cx="877163" cy="369332"/>
+            </a:xfrm>
+            <a:prstGeom prst="rect">
+              <a:avLst/>
+            </a:prstGeom>
+            <a:noFill/>
+            <a:ln>
+              <a:noFill/>
+            </a:ln>
+          </p:spPr>
+          <p:txBody>
+            <a:bodyPr wrap="none" rtlCol="0">
+              <a:spAutoFit/>
+            </a:bodyPr>
+            <a:lstStyle/>
+            <a:p>
+              <a:r>
+                <a:rPr lang="ja-JP" altLang="en-US" dirty="0" smtClean="0">
+                  <a:latin typeface="メイリオ"/>
+                  <a:ea typeface="メイリオ"/>
+                  <a:cs typeface="メイリオ"/>
+                </a:rPr>
+                <a:t>金額</a:t>
+              </a:r>
+              <a:r>
+                <a:rPr kumimoji="1" lang="ja-JP" altLang="en-US" dirty="0" smtClean="0">
+                  <a:latin typeface="メイリオ"/>
+                  <a:ea typeface="メイリオ"/>
+                  <a:cs typeface="メイリオ"/>
+                </a:rPr>
+                <a:t>：</a:t>
+              </a:r>
+              <a:endParaRPr kumimoji="1" lang="ja-JP" altLang="en-US" dirty="0">
+                <a:latin typeface="メイリオ"/>
+                <a:ea typeface="メイリオ"/>
+                <a:cs typeface="メイリオ"/>
+              </a:endParaRPr>
+            </a:p>
+          </p:txBody>
+        </p:sp>
+        <p:sp>
+          <p:nvSpPr>
+            <p:cNvPr id="17" name="テキスト ボックス 16"/>
+            <p:cNvSpPr txBox="1"/>
+            <p:nvPr/>
+          </p:nvSpPr>
+          <p:spPr>
+            <a:xfrm>
+              <a:off x="2579850" y="3357507"/>
+              <a:ext cx="1338828" cy="369332"/>
+            </a:xfrm>
+            <a:prstGeom prst="rect">
+              <a:avLst/>
+            </a:prstGeom>
+            <a:noFill/>
+            <a:ln>
+              <a:noFill/>
+            </a:ln>
+          </p:spPr>
+          <p:txBody>
+            <a:bodyPr wrap="none" rtlCol="0">
+              <a:spAutoFit/>
+            </a:bodyPr>
+            <a:lstStyle/>
+            <a:p>
+              <a:r>
+                <a:rPr lang="en-US" altLang="en-US" dirty="0" smtClean="0">
+                  <a:latin typeface="メイリオ"/>
+                  <a:ea typeface="メイリオ"/>
+                  <a:cs typeface="メイリオ"/>
+                </a:rPr>
+                <a:t>テーブル</a:t>
+              </a:r>
+              <a:r>
+                <a:rPr kumimoji="1" lang="ja-JP" altLang="en-US" dirty="0" smtClean="0">
+                  <a:latin typeface="メイリオ"/>
+                  <a:ea typeface="メイリオ"/>
+                  <a:cs typeface="メイリオ"/>
+                </a:rPr>
+                <a:t>：</a:t>
+              </a:r>
+              <a:endParaRPr kumimoji="1" lang="ja-JP" altLang="en-US" dirty="0">
+                <a:latin typeface="メイリオ"/>
+                <a:ea typeface="メイリオ"/>
+                <a:cs typeface="メイリオ"/>
+              </a:endParaRPr>
+            </a:p>
+          </p:txBody>
+        </p:sp>
+        <p:sp>
+          <p:nvSpPr>
+            <p:cNvPr id="18" name="角丸四角形 17"/>
+            <p:cNvSpPr/>
+            <p:nvPr/>
+          </p:nvSpPr>
+          <p:spPr>
+            <a:xfrm>
+              <a:off x="3041515" y="5982125"/>
+              <a:ext cx="1243263" cy="360947"/>
+            </a:xfrm>
+            <a:prstGeom prst="roundRect">
+              <a:avLst/>
+            </a:prstGeom>
+            <a:noFill/>
+            <a:ln w="25400">
               <a:solidFill>
                 <a:schemeClr val="tx1"/>
               </a:solidFill>
-              <a:latin typeface="メイリオ"/>
-              <a:ea typeface="メイリオ"/>
-              <a:cs typeface="メイリオ"/>
-            </a:endParaRPr>
-          </a:p>
-        </p:txBody>
-      </p:sp>
-      <p:sp>
-        <p:nvSpPr>
-          <p:cNvPr id="19" name="角丸四角形 18"/>
-          <p:cNvSpPr/>
-          <p:nvPr/>
-        </p:nvSpPr>
-        <p:spPr>
-          <a:xfrm>
-            <a:off x="4610962" y="5982125"/>
-            <a:ext cx="1243263" cy="360947"/>
-          </a:xfrm>
-          <a:prstGeom prst="roundRect">
-            <a:avLst/>
-          </a:prstGeom>
-          <a:noFill/>
-          <a:ln w="25400">
-            <a:solidFill>
-              <a:schemeClr val="tx1"/>
-            </a:solidFill>
-          </a:ln>
-          <a:effectLst/>
-        </p:spPr>
-        <p:style>
-          <a:lnRef idx="1">
-            <a:schemeClr val="accent1"/>
-          </a:lnRef>
-          <a:fillRef idx="3">
-            <a:schemeClr val="accent1"/>
-          </a:fillRef>
-          <a:effectRef idx="2">
-            <a:schemeClr val="accent1"/>
-          </a:effectRef>
-          <a:fontRef idx="minor">
-            <a:schemeClr val="lt1"/>
-          </a:fontRef>
-        </p:style>
-        <p:txBody>
-          <a:bodyPr rtlCol="0" anchor="ctr"/>
-          <a:lstStyle/>
-          <a:p>
-            <a:pPr algn="ctr"/>
-            <a:r>
-              <a:rPr lang="ja-JP" altLang="en-US" dirty="0" smtClean="0">
+            </a:ln>
+            <a:effectLst/>
+          </p:spPr>
+          <p:style>
+            <a:lnRef idx="1">
+              <a:schemeClr val="accent1"/>
+            </a:lnRef>
+            <a:fillRef idx="3">
+              <a:schemeClr val="accent1"/>
+            </a:fillRef>
+            <a:effectRef idx="2">
+              <a:schemeClr val="accent1"/>
+            </a:effectRef>
+            <a:fontRef idx="minor">
+              <a:schemeClr val="lt1"/>
+            </a:fontRef>
+          </p:style>
+          <p:txBody>
+            <a:bodyPr rtlCol="0" anchor="ctr"/>
+            <a:lstStyle/>
+            <a:p>
+              <a:pPr algn="ctr"/>
+              <a:r>
+                <a:rPr lang="ja-JP" altLang="en-US" dirty="0" smtClean="0">
+                  <a:solidFill>
+                    <a:schemeClr val="tx1"/>
+                  </a:solidFill>
+                  <a:latin typeface="メイリオ"/>
+                  <a:ea typeface="メイリオ"/>
+                  <a:cs typeface="メイリオ"/>
+                </a:rPr>
+                <a:t>登録</a:t>
+              </a:r>
+              <a:endParaRPr lang="en-US" altLang="ja-JP" dirty="0" smtClean="0">
                 <a:solidFill>
                   <a:schemeClr val="tx1"/>
                 </a:solidFill>
                 <a:latin typeface="メイリオ"/>
                 <a:ea typeface="メイリオ"/>
                 <a:cs typeface="メイリオ"/>
-              </a:rPr>
-              <a:t>取消</a:t>
-            </a:r>
-            <a:endParaRPr lang="en-US" altLang="ja-JP" dirty="0" smtClean="0">
+              </a:endParaRPr>
+            </a:p>
+          </p:txBody>
+        </p:sp>
+        <p:sp>
+          <p:nvSpPr>
+            <p:cNvPr id="19" name="角丸四角形 18"/>
+            <p:cNvSpPr/>
+            <p:nvPr/>
+          </p:nvSpPr>
+          <p:spPr>
+            <a:xfrm>
+              <a:off x="4610962" y="5982125"/>
+              <a:ext cx="1243263" cy="360947"/>
+            </a:xfrm>
+            <a:prstGeom prst="roundRect">
+              <a:avLst/>
+            </a:prstGeom>
+            <a:noFill/>
+            <a:ln w="25400">
               <a:solidFill>
                 <a:schemeClr val="tx1"/>
               </a:solidFill>
-              <a:latin typeface="メイリオ"/>
-              <a:ea typeface="メイリオ"/>
-              <a:cs typeface="メイリオ"/>
-            </a:endParaRPr>
-          </a:p>
-        </p:txBody>
-      </p:sp>
-      <p:sp>
-        <p:nvSpPr>
-          <p:cNvPr id="20" name="正方形/長方形 19"/>
-          <p:cNvSpPr/>
-          <p:nvPr/>
-        </p:nvSpPr>
-        <p:spPr>
-          <a:xfrm>
-            <a:off x="3918678" y="1295947"/>
-            <a:ext cx="2344428" cy="369332"/>
-          </a:xfrm>
-          <a:prstGeom prst="rect">
-            <a:avLst/>
-          </a:prstGeom>
-          <a:noFill/>
-          <a:ln w="25400">
+            </a:ln>
+            <a:effectLst/>
+          </p:spPr>
+          <p:style>
+            <a:lnRef idx="1">
+              <a:schemeClr val="accent1"/>
+            </a:lnRef>
+            <a:fillRef idx="3">
+              <a:schemeClr val="accent1"/>
+            </a:fillRef>
+            <a:effectRef idx="2">
+              <a:schemeClr val="accent1"/>
+            </a:effectRef>
+            <a:fontRef idx="minor">
+              <a:schemeClr val="lt1"/>
+            </a:fontRef>
+          </p:style>
+          <p:txBody>
+            <a:bodyPr rtlCol="0" anchor="ctr"/>
+            <a:lstStyle/>
+            <a:p>
+              <a:pPr algn="ctr"/>
+              <a:r>
+                <a:rPr lang="ja-JP" altLang="en-US" dirty="0" smtClean="0">
+                  <a:solidFill>
+                    <a:schemeClr val="tx1"/>
+                  </a:solidFill>
+                  <a:latin typeface="メイリオ"/>
+                  <a:ea typeface="メイリオ"/>
+                  <a:cs typeface="メイリオ"/>
+                </a:rPr>
+                <a:t>取消</a:t>
+              </a:r>
+              <a:endParaRPr lang="en-US" altLang="ja-JP" dirty="0" smtClean="0">
+                <a:solidFill>
+                  <a:schemeClr val="tx1"/>
+                </a:solidFill>
+                <a:latin typeface="メイリオ"/>
+                <a:ea typeface="メイリオ"/>
+                <a:cs typeface="メイリオ"/>
+              </a:endParaRPr>
+            </a:p>
+          </p:txBody>
+        </p:sp>
+        <p:sp>
+          <p:nvSpPr>
+            <p:cNvPr id="20" name="正方形/長方形 19"/>
+            <p:cNvSpPr/>
+            <p:nvPr/>
+          </p:nvSpPr>
+          <p:spPr>
+            <a:xfrm>
+              <a:off x="3918678" y="1295947"/>
+              <a:ext cx="2344428" cy="369332"/>
+            </a:xfrm>
+            <a:prstGeom prst="rect">
+              <a:avLst/>
+            </a:prstGeom>
+            <a:noFill/>
+            <a:ln w="25400">
+              <a:solidFill>
+                <a:schemeClr val="tx1"/>
+              </a:solidFill>
+            </a:ln>
+            <a:effectLst/>
+          </p:spPr>
+          <p:style>
+            <a:lnRef idx="1">
+              <a:schemeClr val="accent1"/>
+            </a:lnRef>
+            <a:fillRef idx="3">
+              <a:schemeClr val="accent1"/>
+            </a:fillRef>
+            <a:effectRef idx="2">
+              <a:schemeClr val="accent1"/>
+            </a:effectRef>
+            <a:fontRef idx="minor">
+              <a:schemeClr val="lt1"/>
+            </a:fontRef>
+          </p:style>
+          <p:txBody>
+            <a:bodyPr rtlCol="0" anchor="ctr"/>
+            <a:lstStyle/>
+            <a:p>
+              <a:pPr algn="ctr"/>
+              <a:endParaRPr kumimoji="1" lang="ja-JP" altLang="en-US">
+                <a:solidFill>
+                  <a:schemeClr val="tx1"/>
+                </a:solidFill>
+              </a:endParaRPr>
+            </a:p>
+          </p:txBody>
+        </p:sp>
+        <p:sp>
+          <p:nvSpPr>
+            <p:cNvPr id="21" name="正方形/長方形 20"/>
+            <p:cNvSpPr/>
+            <p:nvPr/>
+          </p:nvSpPr>
+          <p:spPr>
+            <a:xfrm>
+              <a:off x="3918678" y="1814570"/>
+              <a:ext cx="2344428" cy="369332"/>
+            </a:xfrm>
+            <a:prstGeom prst="rect">
+              <a:avLst/>
+            </a:prstGeom>
+            <a:noFill/>
+            <a:ln w="25400">
+              <a:solidFill>
+                <a:schemeClr val="tx1"/>
+              </a:solidFill>
+            </a:ln>
+            <a:effectLst/>
+          </p:spPr>
+          <p:style>
+            <a:lnRef idx="1">
+              <a:schemeClr val="accent1"/>
+            </a:lnRef>
+            <a:fillRef idx="3">
+              <a:schemeClr val="accent1"/>
+            </a:fillRef>
+            <a:effectRef idx="2">
+              <a:schemeClr val="accent1"/>
+            </a:effectRef>
+            <a:fontRef idx="minor">
+              <a:schemeClr val="lt1"/>
+            </a:fontRef>
+          </p:style>
+          <p:txBody>
+            <a:bodyPr rtlCol="0" anchor="ctr"/>
+            <a:lstStyle/>
+            <a:p>
+              <a:pPr algn="ctr"/>
+              <a:endParaRPr kumimoji="1" lang="ja-JP" altLang="en-US">
+                <a:solidFill>
+                  <a:schemeClr val="tx1"/>
+                </a:solidFill>
+              </a:endParaRPr>
+            </a:p>
+          </p:txBody>
+        </p:sp>
+        <p:sp>
+          <p:nvSpPr>
+            <p:cNvPr id="22" name="正方形/長方形 21"/>
+            <p:cNvSpPr/>
+            <p:nvPr/>
+          </p:nvSpPr>
+          <p:spPr>
+            <a:xfrm>
+              <a:off x="3918678" y="2842117"/>
+              <a:ext cx="2344428" cy="369332"/>
+            </a:xfrm>
+            <a:prstGeom prst="rect">
+              <a:avLst/>
+            </a:prstGeom>
+            <a:noFill/>
+            <a:ln w="25400">
+              <a:solidFill>
+                <a:schemeClr val="tx1"/>
+              </a:solidFill>
+            </a:ln>
+            <a:effectLst/>
+          </p:spPr>
+          <p:style>
+            <a:lnRef idx="1">
+              <a:schemeClr val="accent1"/>
+            </a:lnRef>
+            <a:fillRef idx="3">
+              <a:schemeClr val="accent1"/>
+            </a:fillRef>
+            <a:effectRef idx="2">
+              <a:schemeClr val="accent1"/>
+            </a:effectRef>
+            <a:fontRef idx="minor">
+              <a:schemeClr val="lt1"/>
+            </a:fontRef>
+          </p:style>
+          <p:txBody>
+            <a:bodyPr rtlCol="0" anchor="ctr"/>
+            <a:lstStyle/>
+            <a:p>
+              <a:pPr algn="ctr"/>
+              <a:endParaRPr kumimoji="1" lang="ja-JP" altLang="en-US">
+                <a:solidFill>
+                  <a:schemeClr val="tx1"/>
+                </a:solidFill>
+              </a:endParaRPr>
+            </a:p>
+          </p:txBody>
+        </p:sp>
+        <p:sp>
+          <p:nvSpPr>
+            <p:cNvPr id="23" name="正方形/長方形 22"/>
+            <p:cNvSpPr/>
+            <p:nvPr/>
+          </p:nvSpPr>
+          <p:spPr>
+            <a:xfrm>
+              <a:off x="3918678" y="2326727"/>
+              <a:ext cx="2344428" cy="369332"/>
+            </a:xfrm>
+            <a:prstGeom prst="rect">
+              <a:avLst/>
+            </a:prstGeom>
+            <a:noFill/>
+            <a:ln w="25400">
+              <a:solidFill>
+                <a:schemeClr val="tx1"/>
+              </a:solidFill>
+            </a:ln>
+            <a:effectLst/>
+          </p:spPr>
+          <p:style>
+            <a:lnRef idx="1">
+              <a:schemeClr val="accent1"/>
+            </a:lnRef>
+            <a:fillRef idx="3">
+              <a:schemeClr val="accent1"/>
+            </a:fillRef>
+            <a:effectRef idx="2">
+              <a:schemeClr val="accent1"/>
+            </a:effectRef>
+            <a:fontRef idx="minor">
+              <a:schemeClr val="lt1"/>
+            </a:fontRef>
+          </p:style>
+          <p:txBody>
+            <a:bodyPr rtlCol="0" anchor="ctr"/>
+            <a:lstStyle/>
+            <a:p>
+              <a:pPr algn="ctr"/>
+              <a:endParaRPr kumimoji="1" lang="ja-JP" altLang="en-US">
+                <a:solidFill>
+                  <a:schemeClr val="tx1"/>
+                </a:solidFill>
+              </a:endParaRPr>
+            </a:p>
+          </p:txBody>
+        </p:sp>
+        <p:sp>
+          <p:nvSpPr>
+            <p:cNvPr id="24" name="円/楕円 23"/>
+            <p:cNvSpPr/>
+            <p:nvPr/>
+          </p:nvSpPr>
+          <p:spPr>
+            <a:xfrm>
+              <a:off x="4169599" y="3464224"/>
+              <a:ext cx="163286" cy="179456"/>
+            </a:xfrm>
+            <a:prstGeom prst="ellipse">
+              <a:avLst/>
+            </a:prstGeom>
             <a:solidFill>
               <a:schemeClr val="tx1"/>
             </a:solidFill>
-          </a:ln>
-          <a:effectLst/>
-        </p:spPr>
-        <p:style>
-          <a:lnRef idx="1">
-            <a:schemeClr val="accent1"/>
-          </a:lnRef>
-          <a:fillRef idx="3">
-            <a:schemeClr val="accent1"/>
-          </a:fillRef>
-          <a:effectRef idx="2">
-            <a:schemeClr val="accent1"/>
-          </a:effectRef>
-          <a:fontRef idx="minor">
-            <a:schemeClr val="lt1"/>
-          </a:fontRef>
-        </p:style>
-        <p:txBody>
-          <a:bodyPr rtlCol="0" anchor="ctr"/>
-          <a:lstStyle/>
-          <a:p>
-            <a:pPr algn="ctr"/>
-            <a:endParaRPr kumimoji="1" lang="ja-JP" altLang="en-US">
+            <a:ln>
               <a:solidFill>
                 <a:schemeClr val="tx1"/>
               </a:solidFill>
-            </a:endParaRPr>
-          </a:p>
-        </p:txBody>
-      </p:sp>
-      <p:sp>
-        <p:nvSpPr>
-          <p:cNvPr id="21" name="正方形/長方形 20"/>
-          <p:cNvSpPr/>
-          <p:nvPr/>
-        </p:nvSpPr>
-        <p:spPr>
-          <a:xfrm>
-            <a:off x="3918678" y="1814570"/>
-            <a:ext cx="2344428" cy="369332"/>
-          </a:xfrm>
-          <a:prstGeom prst="rect">
-            <a:avLst/>
-          </a:prstGeom>
-          <a:noFill/>
-          <a:ln w="25400">
+            </a:ln>
+            <a:effectLst/>
+          </p:spPr>
+          <p:style>
+            <a:lnRef idx="1">
+              <a:schemeClr val="accent1"/>
+            </a:lnRef>
+            <a:fillRef idx="3">
+              <a:schemeClr val="accent1"/>
+            </a:fillRef>
+            <a:effectRef idx="2">
+              <a:schemeClr val="accent1"/>
+            </a:effectRef>
+            <a:fontRef idx="minor">
+              <a:schemeClr val="lt1"/>
+            </a:fontRef>
+          </p:style>
+          <p:txBody>
+            <a:bodyPr rtlCol="0" anchor="ctr"/>
+            <a:lstStyle/>
+            <a:p>
+              <a:pPr algn="ctr"/>
+              <a:endParaRPr kumimoji="1" lang="ja-JP" altLang="en-US">
+                <a:solidFill>
+                  <a:schemeClr val="tx1"/>
+                </a:solidFill>
+              </a:endParaRPr>
+            </a:p>
+          </p:txBody>
+        </p:sp>
+        <p:sp>
+          <p:nvSpPr>
+            <p:cNvPr id="25" name="テキスト ボックス 24"/>
+            <p:cNvSpPr txBox="1"/>
+            <p:nvPr/>
+          </p:nvSpPr>
+          <p:spPr>
+            <a:xfrm>
+              <a:off x="4348521" y="3370783"/>
+              <a:ext cx="646331" cy="369332"/>
+            </a:xfrm>
+            <a:prstGeom prst="rect">
+              <a:avLst/>
+            </a:prstGeom>
+            <a:noFill/>
+            <a:ln>
+              <a:noFill/>
+            </a:ln>
+          </p:spPr>
+          <p:txBody>
+            <a:bodyPr wrap="none" rtlCol="0">
+              <a:spAutoFit/>
+            </a:bodyPr>
+            <a:lstStyle/>
+            <a:p>
+              <a:r>
+                <a:rPr lang="ja-JP" altLang="en-US" dirty="0" smtClean="0">
+                  <a:latin typeface="メイリオ"/>
+                  <a:ea typeface="メイリオ"/>
+                  <a:cs typeface="メイリオ"/>
+                </a:rPr>
+                <a:t>収入</a:t>
+              </a:r>
+              <a:endParaRPr kumimoji="1" lang="ja-JP" altLang="en-US" dirty="0">
+                <a:latin typeface="メイリオ"/>
+                <a:ea typeface="メイリオ"/>
+                <a:cs typeface="メイリオ"/>
+              </a:endParaRPr>
+            </a:p>
+          </p:txBody>
+        </p:sp>
+        <p:sp>
+          <p:nvSpPr>
+            <p:cNvPr id="26" name="円/楕円 25"/>
+            <p:cNvSpPr/>
+            <p:nvPr/>
+          </p:nvSpPr>
+          <p:spPr>
+            <a:xfrm>
+              <a:off x="5064150" y="3467034"/>
+              <a:ext cx="163286" cy="179456"/>
+            </a:xfrm>
+            <a:prstGeom prst="ellipse">
+              <a:avLst/>
+            </a:prstGeom>
             <a:solidFill>
               <a:schemeClr val="tx1"/>
             </a:solidFill>
-          </a:ln>
-          <a:effectLst/>
-        </p:spPr>
-        <p:style>
-          <a:lnRef idx="1">
-            <a:schemeClr val="accent1"/>
-          </a:lnRef>
-          <a:fillRef idx="3">
-            <a:schemeClr val="accent1"/>
-          </a:fillRef>
-          <a:effectRef idx="2">
-            <a:schemeClr val="accent1"/>
-          </a:effectRef>
-          <a:fontRef idx="minor">
-            <a:schemeClr val="lt1"/>
-          </a:fontRef>
-        </p:style>
-        <p:txBody>
-          <a:bodyPr rtlCol="0" anchor="ctr"/>
-          <a:lstStyle/>
-          <a:p>
-            <a:pPr algn="ctr"/>
-            <a:endParaRPr kumimoji="1" lang="ja-JP" altLang="en-US">
+            <a:ln>
               <a:solidFill>
                 <a:schemeClr val="tx1"/>
               </a:solidFill>
-            </a:endParaRPr>
-          </a:p>
-        </p:txBody>
-      </p:sp>
-      <p:sp>
-        <p:nvSpPr>
-          <p:cNvPr id="22" name="正方形/長方形 21"/>
-          <p:cNvSpPr/>
-          <p:nvPr/>
-        </p:nvSpPr>
-        <p:spPr>
-          <a:xfrm>
-            <a:off x="3918678" y="2842117"/>
-            <a:ext cx="2344428" cy="369332"/>
-          </a:xfrm>
-          <a:prstGeom prst="rect">
-            <a:avLst/>
-          </a:prstGeom>
-          <a:noFill/>
-          <a:ln w="25400">
-            <a:solidFill>
-              <a:schemeClr val="tx1"/>
-            </a:solidFill>
-          </a:ln>
-          <a:effectLst/>
-        </p:spPr>
-        <p:style>
-          <a:lnRef idx="1">
-            <a:schemeClr val="accent1"/>
-          </a:lnRef>
-          <a:fillRef idx="3">
-            <a:schemeClr val="accent1"/>
-          </a:fillRef>
-          <a:effectRef idx="2">
-            <a:schemeClr val="accent1"/>
-          </a:effectRef>
-          <a:fontRef idx="minor">
-            <a:schemeClr val="lt1"/>
-          </a:fontRef>
-        </p:style>
-        <p:txBody>
-          <a:bodyPr rtlCol="0" anchor="ctr"/>
-          <a:lstStyle/>
-          <a:p>
-            <a:pPr algn="ctr"/>
-            <a:endParaRPr kumimoji="1" lang="ja-JP" altLang="en-US">
-              <a:solidFill>
-                <a:schemeClr val="tx1"/>
-              </a:solidFill>
-            </a:endParaRPr>
-          </a:p>
-        </p:txBody>
-      </p:sp>
-      <p:sp>
-        <p:nvSpPr>
-          <p:cNvPr id="23" name="正方形/長方形 22"/>
-          <p:cNvSpPr/>
-          <p:nvPr/>
-        </p:nvSpPr>
-        <p:spPr>
-          <a:xfrm>
-            <a:off x="3918678" y="2326727"/>
-            <a:ext cx="2344428" cy="369332"/>
-          </a:xfrm>
-          <a:prstGeom prst="rect">
-            <a:avLst/>
-          </a:prstGeom>
-          <a:noFill/>
-          <a:ln w="25400">
-            <a:solidFill>
-              <a:schemeClr val="tx1"/>
-            </a:solidFill>
-          </a:ln>
-          <a:effectLst/>
-        </p:spPr>
-        <p:style>
-          <a:lnRef idx="1">
-            <a:schemeClr val="accent1"/>
-          </a:lnRef>
-          <a:fillRef idx="3">
-            <a:schemeClr val="accent1"/>
-          </a:fillRef>
-          <a:effectRef idx="2">
-            <a:schemeClr val="accent1"/>
-          </a:effectRef>
-          <a:fontRef idx="minor">
-            <a:schemeClr val="lt1"/>
-          </a:fontRef>
-        </p:style>
-        <p:txBody>
-          <a:bodyPr rtlCol="0" anchor="ctr"/>
-          <a:lstStyle/>
-          <a:p>
-            <a:pPr algn="ctr"/>
-            <a:endParaRPr kumimoji="1" lang="ja-JP" altLang="en-US">
-              <a:solidFill>
-                <a:schemeClr val="tx1"/>
-              </a:solidFill>
-            </a:endParaRPr>
-          </a:p>
-        </p:txBody>
-      </p:sp>
-      <p:sp>
-        <p:nvSpPr>
-          <p:cNvPr id="24" name="円/楕円 23"/>
-          <p:cNvSpPr/>
-          <p:nvPr/>
-        </p:nvSpPr>
-        <p:spPr>
-          <a:xfrm>
-            <a:off x="4169599" y="3464224"/>
-            <a:ext cx="163286" cy="179456"/>
-          </a:xfrm>
-          <a:prstGeom prst="ellipse">
-            <a:avLst/>
-          </a:prstGeom>
-          <a:solidFill>
-            <a:schemeClr val="tx1"/>
-          </a:solidFill>
-          <a:ln>
-            <a:solidFill>
-              <a:schemeClr val="tx1"/>
-            </a:solidFill>
-          </a:ln>
-          <a:effectLst/>
-        </p:spPr>
-        <p:style>
-          <a:lnRef idx="1">
-            <a:schemeClr val="accent1"/>
-          </a:lnRef>
-          <a:fillRef idx="3">
-            <a:schemeClr val="accent1"/>
-          </a:fillRef>
-          <a:effectRef idx="2">
-            <a:schemeClr val="accent1"/>
-          </a:effectRef>
-          <a:fontRef idx="minor">
-            <a:schemeClr val="lt1"/>
-          </a:fontRef>
-        </p:style>
-        <p:txBody>
-          <a:bodyPr rtlCol="0" anchor="ctr"/>
-          <a:lstStyle/>
-          <a:p>
-            <a:pPr algn="ctr"/>
-            <a:endParaRPr kumimoji="1" lang="ja-JP" altLang="en-US">
-              <a:solidFill>
-                <a:schemeClr val="tx1"/>
-              </a:solidFill>
-            </a:endParaRPr>
-          </a:p>
-        </p:txBody>
-      </p:sp>
-      <p:sp>
-        <p:nvSpPr>
-          <p:cNvPr id="25" name="テキスト ボックス 24"/>
-          <p:cNvSpPr txBox="1"/>
-          <p:nvPr/>
-        </p:nvSpPr>
-        <p:spPr>
-          <a:xfrm>
-            <a:off x="4348521" y="3370783"/>
-            <a:ext cx="646331" cy="369332"/>
-          </a:xfrm>
-          <a:prstGeom prst="rect">
-            <a:avLst/>
-          </a:prstGeom>
-          <a:noFill/>
-          <a:ln>
+            </a:ln>
+            <a:effectLst/>
+          </p:spPr>
+          <p:style>
+            <a:lnRef idx="1">
+              <a:schemeClr val="accent1"/>
+            </a:lnRef>
+            <a:fillRef idx="3">
+              <a:schemeClr val="accent1"/>
+            </a:fillRef>
+            <a:effectRef idx="2">
+              <a:schemeClr val="accent1"/>
+            </a:effectRef>
+            <a:fontRef idx="minor">
+              <a:schemeClr val="lt1"/>
+            </a:fontRef>
+          </p:style>
+          <p:txBody>
+            <a:bodyPr rtlCol="0" anchor="ctr"/>
+            <a:lstStyle/>
+            <a:p>
+              <a:pPr algn="ctr"/>
+              <a:endParaRPr kumimoji="1" lang="ja-JP" altLang="en-US">
+                <a:solidFill>
+                  <a:schemeClr val="tx1"/>
+                </a:solidFill>
+              </a:endParaRPr>
+            </a:p>
+          </p:txBody>
+        </p:sp>
+        <p:sp>
+          <p:nvSpPr>
+            <p:cNvPr id="27" name="テキスト ボックス 26"/>
+            <p:cNvSpPr txBox="1"/>
+            <p:nvPr/>
+          </p:nvSpPr>
+          <p:spPr>
+            <a:xfrm>
+              <a:off x="5243072" y="3360225"/>
+              <a:ext cx="646331" cy="369332"/>
+            </a:xfrm>
+            <a:prstGeom prst="rect">
+              <a:avLst/>
+            </a:prstGeom>
             <a:noFill/>
-          </a:ln>
-        </p:spPr>
-        <p:txBody>
-          <a:bodyPr wrap="none" rtlCol="0">
-            <a:spAutoFit/>
-          </a:bodyPr>
-          <a:lstStyle/>
-          <a:p>
-            <a:r>
-              <a:rPr lang="ja-JP" altLang="en-US" dirty="0" smtClean="0">
+            <a:ln>
+              <a:noFill/>
+            </a:ln>
+          </p:spPr>
+          <p:txBody>
+            <a:bodyPr wrap="none" rtlCol="0">
+              <a:spAutoFit/>
+            </a:bodyPr>
+            <a:lstStyle/>
+            <a:p>
+              <a:r>
+                <a:rPr lang="ja-JP" altLang="en-US" dirty="0" smtClean="0">
+                  <a:latin typeface="メイリオ"/>
+                  <a:ea typeface="メイリオ"/>
+                  <a:cs typeface="メイリオ"/>
+                </a:rPr>
+                <a:t>支出</a:t>
+              </a:r>
+              <a:endParaRPr kumimoji="1" lang="ja-JP" altLang="en-US" dirty="0">
                 <a:latin typeface="メイリオ"/>
                 <a:ea typeface="メイリオ"/>
                 <a:cs typeface="メイリオ"/>
-              </a:rPr>
-              <a:t>収入</a:t>
-            </a:r>
-            <a:endParaRPr kumimoji="1" lang="ja-JP" altLang="en-US" dirty="0">
-              <a:latin typeface="メイリオ"/>
-              <a:ea typeface="メイリオ"/>
-              <a:cs typeface="メイリオ"/>
-            </a:endParaRPr>
-          </a:p>
-        </p:txBody>
-      </p:sp>
-      <p:sp>
-        <p:nvSpPr>
-          <p:cNvPr id="26" name="円/楕円 25"/>
-          <p:cNvSpPr/>
-          <p:nvPr/>
-        </p:nvSpPr>
-        <p:spPr>
-          <a:xfrm>
-            <a:off x="5064150" y="3467034"/>
-            <a:ext cx="163286" cy="179456"/>
-          </a:xfrm>
-          <a:prstGeom prst="ellipse">
-            <a:avLst/>
-          </a:prstGeom>
-          <a:solidFill>
-            <a:schemeClr val="tx1"/>
-          </a:solidFill>
-          <a:ln>
-            <a:solidFill>
-              <a:schemeClr val="tx1"/>
-            </a:solidFill>
-          </a:ln>
-          <a:effectLst/>
-        </p:spPr>
-        <p:style>
-          <a:lnRef idx="1">
-            <a:schemeClr val="accent1"/>
-          </a:lnRef>
-          <a:fillRef idx="3">
-            <a:schemeClr val="accent1"/>
-          </a:fillRef>
-          <a:effectRef idx="2">
-            <a:schemeClr val="accent1"/>
-          </a:effectRef>
-          <a:fontRef idx="minor">
-            <a:schemeClr val="lt1"/>
-          </a:fontRef>
-        </p:style>
-        <p:txBody>
-          <a:bodyPr rtlCol="0" anchor="ctr"/>
-          <a:lstStyle/>
-          <a:p>
-            <a:pPr algn="ctr"/>
-            <a:endParaRPr kumimoji="1" lang="ja-JP" altLang="en-US">
-              <a:solidFill>
-                <a:schemeClr val="tx1"/>
-              </a:solidFill>
-            </a:endParaRPr>
-          </a:p>
-        </p:txBody>
-      </p:sp>
-      <p:sp>
-        <p:nvSpPr>
-          <p:cNvPr id="27" name="テキスト ボックス 26"/>
-          <p:cNvSpPr txBox="1"/>
-          <p:nvPr/>
-        </p:nvSpPr>
-        <p:spPr>
-          <a:xfrm>
-            <a:off x="5243072" y="3360225"/>
-            <a:ext cx="646331" cy="369332"/>
-          </a:xfrm>
-          <a:prstGeom prst="rect">
-            <a:avLst/>
-          </a:prstGeom>
-          <a:noFill/>
-          <a:ln>
-            <a:noFill/>
-          </a:ln>
-        </p:spPr>
-        <p:txBody>
-          <a:bodyPr wrap="none" rtlCol="0">
-            <a:spAutoFit/>
-          </a:bodyPr>
-          <a:lstStyle/>
-          <a:p>
-            <a:r>
-              <a:rPr lang="ja-JP" altLang="en-US" dirty="0" smtClean="0">
-                <a:latin typeface="メイリオ"/>
-                <a:ea typeface="メイリオ"/>
-                <a:cs typeface="メイリオ"/>
-              </a:rPr>
-              <a:t>支出</a:t>
-            </a:r>
-            <a:endParaRPr kumimoji="1" lang="ja-JP" altLang="en-US" dirty="0">
-              <a:latin typeface="メイリオ"/>
-              <a:ea typeface="メイリオ"/>
-              <a:cs typeface="メイリオ"/>
-            </a:endParaRPr>
-          </a:p>
-        </p:txBody>
-      </p:sp>
+              </a:endParaRPr>
+            </a:p>
+          </p:txBody>
+        </p:sp>
+      </p:grpSp>
     </p:spTree>
     <p:extLst>
       <p:ext uri="{BB962C8B-B14F-4D97-AF65-F5344CB8AC3E}">

</xml_diff>

<commit_message>
modify ui and class
</commit_message>
<xml_diff>
--- a/adhafera/interface/register.pptx
+++ b/adhafera/interface/register.pptx
@@ -5,11 +5,12 @@
     <p:sldMasterId id="2147483648" r:id="rId1"/>
   </p:sldMasterIdLst>
   <p:notesMasterIdLst>
-    <p:notesMasterId r:id="rId4"/>
+    <p:notesMasterId r:id="rId5"/>
   </p:notesMasterIdLst>
   <p:sldIdLst>
     <p:sldId id="256" r:id="rId2"/>
     <p:sldId id="263" r:id="rId3"/>
+    <p:sldId id="264" r:id="rId4"/>
   </p:sldIdLst>
   <p:sldSz cx="9144000" cy="6858000" type="screen4x3"/>
   <p:notesSz cx="6858000" cy="9144000"/>
@@ -193,7 +194,7 @@
           <a:p>
             <a:fld id="{EE82FEE5-269B-9B49-A8C4-823C45BE6055}" type="datetimeFigureOut">
               <a:rPr kumimoji="1" lang="ja-JP" altLang="en-US" smtClean="0"/>
-              <a:t>15/11/02</a:t>
+              <a:t>15/12/06</a:t>
             </a:fld>
             <a:endParaRPr kumimoji="1" lang="ja-JP" altLang="en-US"/>
           </a:p>
@@ -577,6 +578,90 @@
 </p:notes>
 </file>
 
+<file path=ppt/notesSlides/notesSlide2.xml><?xml version="1.0" encoding="utf-8"?>
+<p:notes xmlns:a="http://schemas.openxmlformats.org/drawingml/2006/main" xmlns:r="http://schemas.openxmlformats.org/officeDocument/2006/relationships" xmlns:p="http://schemas.openxmlformats.org/presentationml/2006/main">
+  <p:cSld>
+    <p:spTree>
+      <p:nvGrpSpPr>
+        <p:cNvPr id="1" name=""/>
+        <p:cNvGrpSpPr/>
+        <p:nvPr/>
+      </p:nvGrpSpPr>
+      <p:grpSpPr>
+        <a:xfrm>
+          <a:off x="0" y="0"/>
+          <a:ext cx="0" cy="0"/>
+          <a:chOff x="0" y="0"/>
+          <a:chExt cx="0" cy="0"/>
+        </a:xfrm>
+      </p:grpSpPr>
+      <p:sp>
+        <p:nvSpPr>
+          <p:cNvPr id="2" name="スライド イメージ プレースホルダー 1"/>
+          <p:cNvSpPr>
+            <a:spLocks noGrp="1" noRot="1" noChangeAspect="1"/>
+          </p:cNvSpPr>
+          <p:nvPr>
+            <p:ph type="sldImg"/>
+          </p:nvPr>
+        </p:nvSpPr>
+        <p:spPr/>
+      </p:sp>
+      <p:sp>
+        <p:nvSpPr>
+          <p:cNvPr id="3" name="ノート プレースホルダー 2"/>
+          <p:cNvSpPr>
+            <a:spLocks noGrp="1"/>
+          </p:cNvSpPr>
+          <p:nvPr>
+            <p:ph type="body" idx="1"/>
+          </p:nvPr>
+        </p:nvSpPr>
+        <p:spPr/>
+        <p:txBody>
+          <a:bodyPr/>
+          <a:lstStyle/>
+          <a:p>
+            <a:endParaRPr kumimoji="1" lang="ja-JP" altLang="en-US" dirty="0"/>
+          </a:p>
+        </p:txBody>
+      </p:sp>
+      <p:sp>
+        <p:nvSpPr>
+          <p:cNvPr id="4" name="スライド番号プレースホルダー 3"/>
+          <p:cNvSpPr>
+            <a:spLocks noGrp="1"/>
+          </p:cNvSpPr>
+          <p:nvPr>
+            <p:ph type="sldNum" sz="quarter" idx="10"/>
+          </p:nvPr>
+        </p:nvSpPr>
+        <p:spPr/>
+        <p:txBody>
+          <a:bodyPr/>
+          <a:lstStyle/>
+          <a:p>
+            <a:fld id="{A9E1B25B-30E5-7A42-A56A-DF1A6F86BC06}" type="slidenum">
+              <a:rPr kumimoji="1" lang="ja-JP" altLang="en-US" smtClean="0"/>
+              <a:t>3</a:t>
+            </a:fld>
+            <a:endParaRPr kumimoji="1" lang="ja-JP" altLang="en-US"/>
+          </a:p>
+        </p:txBody>
+      </p:sp>
+    </p:spTree>
+    <p:extLst>
+      <p:ext uri="{BB962C8B-B14F-4D97-AF65-F5344CB8AC3E}">
+        <p14:creationId xmlns:p14="http://schemas.microsoft.com/office/powerpoint/2010/main" val="3631066132"/>
+      </p:ext>
+    </p:extLst>
+  </p:cSld>
+  <p:clrMapOvr>
+    <a:masterClrMapping/>
+  </p:clrMapOvr>
+</p:notes>
+</file>
+
 <file path=ppt/slideLayouts/slideLayout1.xml><?xml version="1.0" encoding="utf-8"?>
 <p:sldLayout xmlns:a="http://schemas.openxmlformats.org/drawingml/2006/main" xmlns:r="http://schemas.openxmlformats.org/officeDocument/2006/relationships" xmlns:p="http://schemas.openxmlformats.org/presentationml/2006/main" type="title" preserve="1">
   <p:cSld name="タイトル スライド">
@@ -758,7 +843,7 @@
           <a:p>
             <a:fld id="{3ABA01A1-4899-9944-833D-6A66CDE659CB}" type="datetimeFigureOut">
               <a:rPr kumimoji="1" lang="ja-JP" altLang="en-US" smtClean="0"/>
-              <a:t>15/11/02</a:t>
+              <a:t>15/12/06</a:t>
             </a:fld>
             <a:endParaRPr kumimoji="1" lang="ja-JP" altLang="en-US"/>
           </a:p>
@@ -960,7 +1045,7 @@
           <a:p>
             <a:fld id="{3ABA01A1-4899-9944-833D-6A66CDE659CB}" type="datetimeFigureOut">
               <a:rPr kumimoji="1" lang="ja-JP" altLang="en-US" smtClean="0"/>
-              <a:t>15/11/02</a:t>
+              <a:t>15/12/06</a:t>
             </a:fld>
             <a:endParaRPr kumimoji="1" lang="ja-JP" altLang="en-US"/>
           </a:p>
@@ -1172,7 +1257,7 @@
           <a:p>
             <a:fld id="{3ABA01A1-4899-9944-833D-6A66CDE659CB}" type="datetimeFigureOut">
               <a:rPr kumimoji="1" lang="ja-JP" altLang="en-US" smtClean="0"/>
-              <a:t>15/11/02</a:t>
+              <a:t>15/12/06</a:t>
             </a:fld>
             <a:endParaRPr kumimoji="1" lang="ja-JP" altLang="en-US"/>
           </a:p>
@@ -1374,7 +1459,7 @@
           <a:p>
             <a:fld id="{3ABA01A1-4899-9944-833D-6A66CDE659CB}" type="datetimeFigureOut">
               <a:rPr kumimoji="1" lang="ja-JP" altLang="en-US" smtClean="0"/>
-              <a:t>15/11/02</a:t>
+              <a:t>15/12/06</a:t>
             </a:fld>
             <a:endParaRPr kumimoji="1" lang="ja-JP" altLang="en-US"/>
           </a:p>
@@ -1620,7 +1705,7 @@
           <a:p>
             <a:fld id="{3ABA01A1-4899-9944-833D-6A66CDE659CB}" type="datetimeFigureOut">
               <a:rPr kumimoji="1" lang="ja-JP" altLang="en-US" smtClean="0"/>
-              <a:t>15/11/02</a:t>
+              <a:t>15/12/06</a:t>
             </a:fld>
             <a:endParaRPr kumimoji="1" lang="ja-JP" altLang="en-US"/>
           </a:p>
@@ -1972,7 +2057,7 @@
           <a:p>
             <a:fld id="{3ABA01A1-4899-9944-833D-6A66CDE659CB}" type="datetimeFigureOut">
               <a:rPr kumimoji="1" lang="ja-JP" altLang="en-US" smtClean="0"/>
-              <a:t>15/11/02</a:t>
+              <a:t>15/12/06</a:t>
             </a:fld>
             <a:endParaRPr kumimoji="1" lang="ja-JP" altLang="en-US"/>
           </a:p>
@@ -2458,7 +2543,7 @@
           <a:p>
             <a:fld id="{3ABA01A1-4899-9944-833D-6A66CDE659CB}" type="datetimeFigureOut">
               <a:rPr kumimoji="1" lang="ja-JP" altLang="en-US" smtClean="0"/>
-              <a:t>15/11/02</a:t>
+              <a:t>15/12/06</a:t>
             </a:fld>
             <a:endParaRPr kumimoji="1" lang="ja-JP" altLang="en-US"/>
           </a:p>
@@ -2576,7 +2661,7 @@
           <a:p>
             <a:fld id="{3ABA01A1-4899-9944-833D-6A66CDE659CB}" type="datetimeFigureOut">
               <a:rPr kumimoji="1" lang="ja-JP" altLang="en-US" smtClean="0"/>
-              <a:t>15/11/02</a:t>
+              <a:t>15/12/06</a:t>
             </a:fld>
             <a:endParaRPr kumimoji="1" lang="ja-JP" altLang="en-US"/>
           </a:p>
@@ -2671,7 +2756,7 @@
           <a:p>
             <a:fld id="{3ABA01A1-4899-9944-833D-6A66CDE659CB}" type="datetimeFigureOut">
               <a:rPr kumimoji="1" lang="ja-JP" altLang="en-US" smtClean="0"/>
-              <a:t>15/11/02</a:t>
+              <a:t>15/12/06</a:t>
             </a:fld>
             <a:endParaRPr kumimoji="1" lang="ja-JP" altLang="en-US"/>
           </a:p>
@@ -2980,7 +3065,7 @@
           <a:p>
             <a:fld id="{3ABA01A1-4899-9944-833D-6A66CDE659CB}" type="datetimeFigureOut">
               <a:rPr kumimoji="1" lang="ja-JP" altLang="en-US" smtClean="0"/>
-              <a:t>15/11/02</a:t>
+              <a:t>15/12/06</a:t>
             </a:fld>
             <a:endParaRPr kumimoji="1" lang="ja-JP" altLang="en-US"/>
           </a:p>
@@ -3233,7 +3318,7 @@
           <a:p>
             <a:fld id="{3ABA01A1-4899-9944-833D-6A66CDE659CB}" type="datetimeFigureOut">
               <a:rPr kumimoji="1" lang="ja-JP" altLang="en-US" smtClean="0"/>
-              <a:t>15/11/02</a:t>
+              <a:t>15/12/06</a:t>
             </a:fld>
             <a:endParaRPr kumimoji="1" lang="ja-JP" altLang="en-US"/>
           </a:p>
@@ -3478,7 +3563,7 @@
           <a:p>
             <a:fld id="{3ABA01A1-4899-9944-833D-6A66CDE659CB}" type="datetimeFigureOut">
               <a:rPr kumimoji="1" lang="ja-JP" altLang="en-US" smtClean="0"/>
-              <a:t>15/11/02</a:t>
+              <a:t>15/12/06</a:t>
             </a:fld>
             <a:endParaRPr kumimoji="1" lang="ja-JP" altLang="en-US"/>
           </a:p>
@@ -3914,19 +3999,11 @@
             </a:r>
             <a:r>
               <a:rPr lang="en-US" altLang="ja-JP" sz="2800" dirty="0" smtClean="0"/>
-              <a:t>2015</a:t>
+              <a:t>2015/</a:t>
             </a:r>
             <a:r>
               <a:rPr lang="en-US" altLang="ja-JP" sz="2800" dirty="0" smtClean="0"/>
-              <a:t>/</a:t>
-            </a:r>
-            <a:r>
-              <a:rPr lang="en-US" altLang="ja-JP" sz="2800" dirty="0" smtClean="0"/>
-              <a:t>11</a:t>
-            </a:r>
-            <a:r>
-              <a:rPr lang="en-US" altLang="ja-JP" sz="2800" dirty="0" smtClean="0"/>
-              <a:t>/02</a:t>
+              <a:t>12/06</a:t>
             </a:r>
             <a:r>
               <a:rPr lang="en-US" altLang="ja-JP" sz="2800" dirty="0" smtClean="0"/>
@@ -4279,13 +4356,752 @@
         </p:sp>
         <p:sp>
           <p:nvSpPr>
-            <p:cNvPr id="17" name="テキスト ボックス 16"/>
+            <p:cNvPr id="18" name="角丸四角形 17"/>
+            <p:cNvSpPr/>
+            <p:nvPr/>
+          </p:nvSpPr>
+          <p:spPr>
+            <a:xfrm>
+              <a:off x="3041515" y="5982125"/>
+              <a:ext cx="1243263" cy="360947"/>
+            </a:xfrm>
+            <a:prstGeom prst="roundRect">
+              <a:avLst/>
+            </a:prstGeom>
+            <a:noFill/>
+            <a:ln w="25400">
+              <a:solidFill>
+                <a:schemeClr val="tx1"/>
+              </a:solidFill>
+            </a:ln>
+            <a:effectLst/>
+          </p:spPr>
+          <p:style>
+            <a:lnRef idx="1">
+              <a:schemeClr val="accent1"/>
+            </a:lnRef>
+            <a:fillRef idx="3">
+              <a:schemeClr val="accent1"/>
+            </a:fillRef>
+            <a:effectRef idx="2">
+              <a:schemeClr val="accent1"/>
+            </a:effectRef>
+            <a:fontRef idx="minor">
+              <a:schemeClr val="lt1"/>
+            </a:fontRef>
+          </p:style>
+          <p:txBody>
+            <a:bodyPr rtlCol="0" anchor="ctr"/>
+            <a:lstStyle/>
+            <a:p>
+              <a:pPr algn="ctr"/>
+              <a:r>
+                <a:rPr lang="ja-JP" altLang="en-US" dirty="0" smtClean="0">
+                  <a:solidFill>
+                    <a:schemeClr val="tx1"/>
+                  </a:solidFill>
+                  <a:latin typeface="メイリオ"/>
+                  <a:ea typeface="メイリオ"/>
+                  <a:cs typeface="メイリオ"/>
+                </a:rPr>
+                <a:t>登録</a:t>
+              </a:r>
+              <a:endParaRPr lang="en-US" altLang="ja-JP" dirty="0" smtClean="0">
+                <a:solidFill>
+                  <a:schemeClr val="tx1"/>
+                </a:solidFill>
+                <a:latin typeface="メイリオ"/>
+                <a:ea typeface="メイリオ"/>
+                <a:cs typeface="メイリオ"/>
+              </a:endParaRPr>
+            </a:p>
+          </p:txBody>
+        </p:sp>
+        <p:sp>
+          <p:nvSpPr>
+            <p:cNvPr id="19" name="角丸四角形 18"/>
+            <p:cNvSpPr/>
+            <p:nvPr/>
+          </p:nvSpPr>
+          <p:spPr>
+            <a:xfrm>
+              <a:off x="4610962" y="5982125"/>
+              <a:ext cx="1243263" cy="360947"/>
+            </a:xfrm>
+            <a:prstGeom prst="roundRect">
+              <a:avLst/>
+            </a:prstGeom>
+            <a:noFill/>
+            <a:ln w="25400">
+              <a:solidFill>
+                <a:schemeClr val="tx1"/>
+              </a:solidFill>
+            </a:ln>
+            <a:effectLst/>
+          </p:spPr>
+          <p:style>
+            <a:lnRef idx="1">
+              <a:schemeClr val="accent1"/>
+            </a:lnRef>
+            <a:fillRef idx="3">
+              <a:schemeClr val="accent1"/>
+            </a:fillRef>
+            <a:effectRef idx="2">
+              <a:schemeClr val="accent1"/>
+            </a:effectRef>
+            <a:fontRef idx="minor">
+              <a:schemeClr val="lt1"/>
+            </a:fontRef>
+          </p:style>
+          <p:txBody>
+            <a:bodyPr rtlCol="0" anchor="ctr"/>
+            <a:lstStyle/>
+            <a:p>
+              <a:pPr algn="ctr"/>
+              <a:r>
+                <a:rPr lang="ja-JP" altLang="en-US" dirty="0" smtClean="0">
+                  <a:solidFill>
+                    <a:schemeClr val="tx1"/>
+                  </a:solidFill>
+                  <a:latin typeface="メイリオ"/>
+                  <a:ea typeface="メイリオ"/>
+                  <a:cs typeface="メイリオ"/>
+                </a:rPr>
+                <a:t>取消</a:t>
+              </a:r>
+              <a:endParaRPr lang="en-US" altLang="ja-JP" dirty="0" smtClean="0">
+                <a:solidFill>
+                  <a:schemeClr val="tx1"/>
+                </a:solidFill>
+                <a:latin typeface="メイリオ"/>
+                <a:ea typeface="メイリオ"/>
+                <a:cs typeface="メイリオ"/>
+              </a:endParaRPr>
+            </a:p>
+          </p:txBody>
+        </p:sp>
+        <p:sp>
+          <p:nvSpPr>
+            <p:cNvPr id="20" name="正方形/長方形 19"/>
+            <p:cNvSpPr/>
+            <p:nvPr/>
+          </p:nvSpPr>
+          <p:spPr>
+            <a:xfrm>
+              <a:off x="3918678" y="1295947"/>
+              <a:ext cx="1935547" cy="369332"/>
+            </a:xfrm>
+            <a:prstGeom prst="rect">
+              <a:avLst/>
+            </a:prstGeom>
+            <a:noFill/>
+            <a:ln w="25400">
+              <a:solidFill>
+                <a:schemeClr val="tx1"/>
+              </a:solidFill>
+            </a:ln>
+            <a:effectLst/>
+          </p:spPr>
+          <p:style>
+            <a:lnRef idx="1">
+              <a:schemeClr val="accent1"/>
+            </a:lnRef>
+            <a:fillRef idx="3">
+              <a:schemeClr val="accent1"/>
+            </a:fillRef>
+            <a:effectRef idx="2">
+              <a:schemeClr val="accent1"/>
+            </a:effectRef>
+            <a:fontRef idx="minor">
+              <a:schemeClr val="lt1"/>
+            </a:fontRef>
+          </p:style>
+          <p:txBody>
+            <a:bodyPr rtlCol="0" anchor="ctr"/>
+            <a:lstStyle/>
+            <a:p>
+              <a:pPr algn="ctr"/>
+              <a:endParaRPr kumimoji="1" lang="ja-JP" altLang="en-US">
+                <a:solidFill>
+                  <a:schemeClr val="tx1"/>
+                </a:solidFill>
+              </a:endParaRPr>
+            </a:p>
+          </p:txBody>
+        </p:sp>
+        <p:sp>
+          <p:nvSpPr>
+            <p:cNvPr id="21" name="正方形/長方形 20"/>
+            <p:cNvSpPr/>
+            <p:nvPr/>
+          </p:nvSpPr>
+          <p:spPr>
+            <a:xfrm>
+              <a:off x="3918678" y="1814570"/>
+              <a:ext cx="1935547" cy="369332"/>
+            </a:xfrm>
+            <a:prstGeom prst="rect">
+              <a:avLst/>
+            </a:prstGeom>
+            <a:noFill/>
+            <a:ln w="25400">
+              <a:solidFill>
+                <a:schemeClr val="tx1"/>
+              </a:solidFill>
+            </a:ln>
+            <a:effectLst/>
+          </p:spPr>
+          <p:style>
+            <a:lnRef idx="1">
+              <a:schemeClr val="accent1"/>
+            </a:lnRef>
+            <a:fillRef idx="3">
+              <a:schemeClr val="accent1"/>
+            </a:fillRef>
+            <a:effectRef idx="2">
+              <a:schemeClr val="accent1"/>
+            </a:effectRef>
+            <a:fontRef idx="minor">
+              <a:schemeClr val="lt1"/>
+            </a:fontRef>
+          </p:style>
+          <p:txBody>
+            <a:bodyPr rtlCol="0" anchor="ctr"/>
+            <a:lstStyle/>
+            <a:p>
+              <a:pPr algn="ctr"/>
+              <a:endParaRPr kumimoji="1" lang="ja-JP" altLang="en-US">
+                <a:solidFill>
+                  <a:schemeClr val="tx1"/>
+                </a:solidFill>
+              </a:endParaRPr>
+            </a:p>
+          </p:txBody>
+        </p:sp>
+        <p:sp>
+          <p:nvSpPr>
+            <p:cNvPr id="22" name="正方形/長方形 21"/>
+            <p:cNvSpPr/>
+            <p:nvPr/>
+          </p:nvSpPr>
+          <p:spPr>
+            <a:xfrm>
+              <a:off x="3918678" y="2842117"/>
+              <a:ext cx="1935547" cy="369332"/>
+            </a:xfrm>
+            <a:prstGeom prst="rect">
+              <a:avLst/>
+            </a:prstGeom>
+            <a:noFill/>
+            <a:ln w="25400">
+              <a:solidFill>
+                <a:schemeClr val="tx1"/>
+              </a:solidFill>
+            </a:ln>
+            <a:effectLst/>
+          </p:spPr>
+          <p:style>
+            <a:lnRef idx="1">
+              <a:schemeClr val="accent1"/>
+            </a:lnRef>
+            <a:fillRef idx="3">
+              <a:schemeClr val="accent1"/>
+            </a:fillRef>
+            <a:effectRef idx="2">
+              <a:schemeClr val="accent1"/>
+            </a:effectRef>
+            <a:fontRef idx="minor">
+              <a:schemeClr val="lt1"/>
+            </a:fontRef>
+          </p:style>
+          <p:txBody>
+            <a:bodyPr rtlCol="0" anchor="ctr"/>
+            <a:lstStyle/>
+            <a:p>
+              <a:pPr algn="ctr"/>
+              <a:endParaRPr kumimoji="1" lang="ja-JP" altLang="en-US">
+                <a:solidFill>
+                  <a:schemeClr val="tx1"/>
+                </a:solidFill>
+              </a:endParaRPr>
+            </a:p>
+          </p:txBody>
+        </p:sp>
+        <p:sp>
+          <p:nvSpPr>
+            <p:cNvPr id="23" name="正方形/長方形 22"/>
+            <p:cNvSpPr/>
+            <p:nvPr/>
+          </p:nvSpPr>
+          <p:spPr>
+            <a:xfrm>
+              <a:off x="3918678" y="2326727"/>
+              <a:ext cx="1935547" cy="369332"/>
+            </a:xfrm>
+            <a:prstGeom prst="rect">
+              <a:avLst/>
+            </a:prstGeom>
+            <a:noFill/>
+            <a:ln w="25400">
+              <a:solidFill>
+                <a:schemeClr val="tx1"/>
+              </a:solidFill>
+            </a:ln>
+            <a:effectLst/>
+          </p:spPr>
+          <p:style>
+            <a:lnRef idx="1">
+              <a:schemeClr val="accent1"/>
+            </a:lnRef>
+            <a:fillRef idx="3">
+              <a:schemeClr val="accent1"/>
+            </a:fillRef>
+            <a:effectRef idx="2">
+              <a:schemeClr val="accent1"/>
+            </a:effectRef>
+            <a:fontRef idx="minor">
+              <a:schemeClr val="lt1"/>
+            </a:fontRef>
+          </p:style>
+          <p:txBody>
+            <a:bodyPr rtlCol="0" anchor="ctr"/>
+            <a:lstStyle/>
+            <a:p>
+              <a:pPr algn="ctr"/>
+              <a:endParaRPr kumimoji="1" lang="ja-JP" altLang="en-US">
+                <a:solidFill>
+                  <a:schemeClr val="tx1"/>
+                </a:solidFill>
+              </a:endParaRPr>
+            </a:p>
+          </p:txBody>
+        </p:sp>
+        <p:sp>
+          <p:nvSpPr>
+            <p:cNvPr id="24" name="円/楕円 23"/>
+            <p:cNvSpPr/>
+            <p:nvPr/>
+          </p:nvSpPr>
+          <p:spPr>
+            <a:xfrm>
+              <a:off x="3635449" y="3464224"/>
+              <a:ext cx="163286" cy="179456"/>
+            </a:xfrm>
+            <a:prstGeom prst="ellipse">
+              <a:avLst/>
+            </a:prstGeom>
+            <a:solidFill>
+              <a:schemeClr val="tx1"/>
+            </a:solidFill>
+            <a:ln>
+              <a:solidFill>
+                <a:schemeClr val="tx1"/>
+              </a:solidFill>
+            </a:ln>
+            <a:effectLst/>
+          </p:spPr>
+          <p:style>
+            <a:lnRef idx="1">
+              <a:schemeClr val="accent1"/>
+            </a:lnRef>
+            <a:fillRef idx="3">
+              <a:schemeClr val="accent1"/>
+            </a:fillRef>
+            <a:effectRef idx="2">
+              <a:schemeClr val="accent1"/>
+            </a:effectRef>
+            <a:fontRef idx="minor">
+              <a:schemeClr val="lt1"/>
+            </a:fontRef>
+          </p:style>
+          <p:txBody>
+            <a:bodyPr rtlCol="0" anchor="ctr"/>
+            <a:lstStyle/>
+            <a:p>
+              <a:pPr algn="ctr"/>
+              <a:endParaRPr kumimoji="1" lang="ja-JP" altLang="en-US">
+                <a:solidFill>
+                  <a:schemeClr val="tx1"/>
+                </a:solidFill>
+              </a:endParaRPr>
+            </a:p>
+          </p:txBody>
+        </p:sp>
+        <p:sp>
+          <p:nvSpPr>
+            <p:cNvPr id="25" name="テキスト ボックス 24"/>
             <p:cNvSpPr txBox="1"/>
             <p:nvPr/>
           </p:nvSpPr>
           <p:spPr>
             <a:xfrm>
-              <a:off x="2579850" y="3357507"/>
+              <a:off x="3814371" y="3370783"/>
+              <a:ext cx="646331" cy="369332"/>
+            </a:xfrm>
+            <a:prstGeom prst="rect">
+              <a:avLst/>
+            </a:prstGeom>
+            <a:noFill/>
+            <a:ln>
+              <a:noFill/>
+            </a:ln>
+          </p:spPr>
+          <p:txBody>
+            <a:bodyPr wrap="none" rtlCol="0">
+              <a:spAutoFit/>
+            </a:bodyPr>
+            <a:lstStyle/>
+            <a:p>
+              <a:r>
+                <a:rPr lang="ja-JP" altLang="en-US" dirty="0" smtClean="0">
+                  <a:latin typeface="メイリオ"/>
+                  <a:ea typeface="メイリオ"/>
+                  <a:cs typeface="メイリオ"/>
+                </a:rPr>
+                <a:t>収入</a:t>
+              </a:r>
+              <a:endParaRPr kumimoji="1" lang="ja-JP" altLang="en-US" dirty="0">
+                <a:latin typeface="メイリオ"/>
+                <a:ea typeface="メイリオ"/>
+                <a:cs typeface="メイリオ"/>
+              </a:endParaRPr>
+            </a:p>
+          </p:txBody>
+        </p:sp>
+        <p:sp>
+          <p:nvSpPr>
+            <p:cNvPr id="26" name="円/楕円 25"/>
+            <p:cNvSpPr/>
+            <p:nvPr/>
+          </p:nvSpPr>
+          <p:spPr>
+            <a:xfrm>
+              <a:off x="4530000" y="3467034"/>
+              <a:ext cx="163286" cy="179456"/>
+            </a:xfrm>
+            <a:prstGeom prst="ellipse">
+              <a:avLst/>
+            </a:prstGeom>
+            <a:solidFill>
+              <a:schemeClr val="tx1"/>
+            </a:solidFill>
+            <a:ln>
+              <a:solidFill>
+                <a:schemeClr val="tx1"/>
+              </a:solidFill>
+            </a:ln>
+            <a:effectLst/>
+          </p:spPr>
+          <p:style>
+            <a:lnRef idx="1">
+              <a:schemeClr val="accent1"/>
+            </a:lnRef>
+            <a:fillRef idx="3">
+              <a:schemeClr val="accent1"/>
+            </a:fillRef>
+            <a:effectRef idx="2">
+              <a:schemeClr val="accent1"/>
+            </a:effectRef>
+            <a:fontRef idx="minor">
+              <a:schemeClr val="lt1"/>
+            </a:fontRef>
+          </p:style>
+          <p:txBody>
+            <a:bodyPr rtlCol="0" anchor="ctr"/>
+            <a:lstStyle/>
+            <a:p>
+              <a:pPr algn="ctr"/>
+              <a:endParaRPr kumimoji="1" lang="ja-JP" altLang="en-US">
+                <a:solidFill>
+                  <a:schemeClr val="tx1"/>
+                </a:solidFill>
+              </a:endParaRPr>
+            </a:p>
+          </p:txBody>
+        </p:sp>
+        <p:sp>
+          <p:nvSpPr>
+            <p:cNvPr id="27" name="テキスト ボックス 26"/>
+            <p:cNvSpPr txBox="1"/>
+            <p:nvPr/>
+          </p:nvSpPr>
+          <p:spPr>
+            <a:xfrm>
+              <a:off x="4708922" y="3360225"/>
+              <a:ext cx="646331" cy="369332"/>
+            </a:xfrm>
+            <a:prstGeom prst="rect">
+              <a:avLst/>
+            </a:prstGeom>
+            <a:noFill/>
+            <a:ln>
+              <a:noFill/>
+            </a:ln>
+          </p:spPr>
+          <p:txBody>
+            <a:bodyPr wrap="none" rtlCol="0">
+              <a:spAutoFit/>
+            </a:bodyPr>
+            <a:lstStyle/>
+            <a:p>
+              <a:r>
+                <a:rPr lang="ja-JP" altLang="en-US" dirty="0" smtClean="0">
+                  <a:latin typeface="メイリオ"/>
+                  <a:ea typeface="メイリオ"/>
+                  <a:cs typeface="メイリオ"/>
+                </a:rPr>
+                <a:t>支出</a:t>
+              </a:r>
+              <a:endParaRPr kumimoji="1" lang="ja-JP" altLang="en-US" dirty="0">
+                <a:latin typeface="メイリオ"/>
+                <a:ea typeface="メイリオ"/>
+                <a:cs typeface="メイリオ"/>
+              </a:endParaRPr>
+            </a:p>
+          </p:txBody>
+        </p:sp>
+      </p:grpSp>
+    </p:spTree>
+    <p:extLst>
+      <p:ext uri="{BB962C8B-B14F-4D97-AF65-F5344CB8AC3E}">
+        <p14:creationId xmlns:p14="http://schemas.microsoft.com/office/powerpoint/2010/main" val="1574216287"/>
+      </p:ext>
+    </p:extLst>
+  </p:cSld>
+  <p:clrMapOvr>
+    <a:masterClrMapping/>
+  </p:clrMapOvr>
+</p:sld>
+</file>
+
+<file path=ppt/slides/slide3.xml><?xml version="1.0" encoding="utf-8"?>
+<p:sld xmlns:a="http://schemas.openxmlformats.org/drawingml/2006/main" xmlns:r="http://schemas.openxmlformats.org/officeDocument/2006/relationships" xmlns:p="http://schemas.openxmlformats.org/presentationml/2006/main">
+  <p:cSld>
+    <p:spTree>
+      <p:nvGrpSpPr>
+        <p:cNvPr id="1" name=""/>
+        <p:cNvGrpSpPr/>
+        <p:nvPr/>
+      </p:nvGrpSpPr>
+      <p:grpSpPr>
+        <a:xfrm>
+          <a:off x="0" y="0"/>
+          <a:ext cx="0" cy="0"/>
+          <a:chOff x="0" y="0"/>
+          <a:chExt cx="0" cy="0"/>
+        </a:xfrm>
+      </p:grpSpPr>
+      <p:sp>
+        <p:nvSpPr>
+          <p:cNvPr id="4" name="テキスト ボックス 3"/>
+          <p:cNvSpPr txBox="1"/>
+          <p:nvPr/>
+        </p:nvSpPr>
+        <p:spPr>
+          <a:xfrm>
+            <a:off x="200532" y="187161"/>
+            <a:ext cx="1980029" cy="523220"/>
+          </a:xfrm>
+          <a:prstGeom prst="rect">
+            <a:avLst/>
+          </a:prstGeom>
+          <a:noFill/>
+        </p:spPr>
+        <p:txBody>
+          <a:bodyPr wrap="none" rtlCol="0">
+            <a:spAutoFit/>
+          </a:bodyPr>
+          <a:lstStyle/>
+          <a:p>
+            <a:r>
+              <a:rPr lang="ja-JP" altLang="en-US" sz="2800" dirty="0" smtClean="0">
+                <a:latin typeface="メイリオ"/>
+                <a:ea typeface="メイリオ"/>
+                <a:cs typeface="メイリオ"/>
+              </a:rPr>
+              <a:t>登録</a:t>
+            </a:r>
+            <a:r>
+              <a:rPr lang="ja-JP" altLang="en-US" sz="2800" dirty="0" smtClean="0">
+                <a:latin typeface="メイリオ"/>
+                <a:ea typeface="メイリオ"/>
+                <a:cs typeface="メイリオ"/>
+              </a:rPr>
+              <a:t>失敗時</a:t>
+            </a:r>
+            <a:endParaRPr kumimoji="1" lang="ja-JP" altLang="en-US" sz="2000" dirty="0">
+              <a:latin typeface="メイリオ"/>
+              <a:ea typeface="メイリオ"/>
+              <a:cs typeface="メイリオ"/>
+            </a:endParaRPr>
+          </a:p>
+        </p:txBody>
+      </p:sp>
+      <p:grpSp>
+        <p:nvGrpSpPr>
+          <p:cNvPr id="2" name="図形グループ 1"/>
+          <p:cNvGrpSpPr/>
+          <p:nvPr/>
+        </p:nvGrpSpPr>
+        <p:grpSpPr>
+          <a:xfrm>
+            <a:off x="2399632" y="815476"/>
+            <a:ext cx="4130842" cy="5788523"/>
+            <a:chOff x="2399632" y="815476"/>
+            <a:chExt cx="4130842" cy="5788523"/>
+          </a:xfrm>
+        </p:grpSpPr>
+        <p:sp>
+          <p:nvSpPr>
+            <p:cNvPr id="5" name="正方形/長方形 4"/>
+            <p:cNvSpPr/>
+            <p:nvPr/>
+          </p:nvSpPr>
+          <p:spPr>
+            <a:xfrm>
+              <a:off x="2399632" y="815476"/>
+              <a:ext cx="4130842" cy="5788523"/>
+            </a:xfrm>
+            <a:prstGeom prst="rect">
+              <a:avLst/>
+            </a:prstGeom>
+            <a:noFill/>
+            <a:ln w="25400">
+              <a:solidFill>
+                <a:schemeClr val="tx1"/>
+              </a:solidFill>
+            </a:ln>
+            <a:effectLst/>
+          </p:spPr>
+          <p:style>
+            <a:lnRef idx="1">
+              <a:schemeClr val="accent1"/>
+            </a:lnRef>
+            <a:fillRef idx="3">
+              <a:schemeClr val="accent1"/>
+            </a:fillRef>
+            <a:effectRef idx="2">
+              <a:schemeClr val="accent1"/>
+            </a:effectRef>
+            <a:fontRef idx="minor">
+              <a:schemeClr val="lt1"/>
+            </a:fontRef>
+          </p:style>
+          <p:txBody>
+            <a:bodyPr rtlCol="0" anchor="ctr"/>
+            <a:lstStyle/>
+            <a:p>
+              <a:pPr algn="ctr"/>
+              <a:endParaRPr kumimoji="1" lang="ja-JP" altLang="en-US" sz="2800" dirty="0">
+                <a:solidFill>
+                  <a:schemeClr val="tx1"/>
+                </a:solidFill>
+                <a:latin typeface="メイリオ"/>
+                <a:ea typeface="メイリオ"/>
+                <a:cs typeface="メイリオ"/>
+              </a:endParaRPr>
+            </a:p>
+          </p:txBody>
+        </p:sp>
+        <p:sp>
+          <p:nvSpPr>
+            <p:cNvPr id="13" name="テキスト ボックス 12"/>
+            <p:cNvSpPr txBox="1"/>
+            <p:nvPr/>
+          </p:nvSpPr>
+          <p:spPr>
+            <a:xfrm>
+              <a:off x="3041515" y="1295947"/>
+              <a:ext cx="877163" cy="369332"/>
+            </a:xfrm>
+            <a:prstGeom prst="rect">
+              <a:avLst/>
+            </a:prstGeom>
+            <a:noFill/>
+            <a:ln>
+              <a:noFill/>
+            </a:ln>
+          </p:spPr>
+          <p:txBody>
+            <a:bodyPr wrap="none" rtlCol="0">
+              <a:spAutoFit/>
+            </a:bodyPr>
+            <a:lstStyle/>
+            <a:p>
+              <a:r>
+                <a:rPr kumimoji="1" lang="ja-JP" altLang="en-US" dirty="0" smtClean="0">
+                  <a:latin typeface="メイリオ"/>
+                  <a:ea typeface="メイリオ"/>
+                  <a:cs typeface="メイリオ"/>
+                </a:rPr>
+                <a:t>日付：</a:t>
+              </a:r>
+              <a:endParaRPr kumimoji="1" lang="ja-JP" altLang="en-US" dirty="0">
+                <a:latin typeface="メイリオ"/>
+                <a:ea typeface="メイリオ"/>
+                <a:cs typeface="メイリオ"/>
+              </a:endParaRPr>
+            </a:p>
+          </p:txBody>
+        </p:sp>
+        <p:sp>
+          <p:nvSpPr>
+            <p:cNvPr id="14" name="テキスト ボックス 13"/>
+            <p:cNvSpPr txBox="1"/>
+            <p:nvPr/>
+          </p:nvSpPr>
+          <p:spPr>
+            <a:xfrm>
+              <a:off x="3041515" y="1811337"/>
+              <a:ext cx="877163" cy="369332"/>
+            </a:xfrm>
+            <a:prstGeom prst="rect">
+              <a:avLst/>
+            </a:prstGeom>
+            <a:noFill/>
+            <a:ln>
+              <a:noFill/>
+            </a:ln>
+          </p:spPr>
+          <p:txBody>
+            <a:bodyPr wrap="none" rtlCol="0">
+              <a:spAutoFit/>
+            </a:bodyPr>
+            <a:lstStyle/>
+            <a:p>
+              <a:r>
+                <a:rPr lang="ja-JP" altLang="en-US" dirty="0" smtClean="0">
+                  <a:latin typeface="メイリオ"/>
+                  <a:ea typeface="メイリオ"/>
+                  <a:cs typeface="メイリオ"/>
+                </a:rPr>
+                <a:t>内容</a:t>
+              </a:r>
+              <a:r>
+                <a:rPr kumimoji="1" lang="ja-JP" altLang="en-US" dirty="0" smtClean="0">
+                  <a:latin typeface="メイリオ"/>
+                  <a:ea typeface="メイリオ"/>
+                  <a:cs typeface="メイリオ"/>
+                </a:rPr>
+                <a:t>：</a:t>
+              </a:r>
+              <a:endParaRPr kumimoji="1" lang="ja-JP" altLang="en-US" dirty="0">
+                <a:latin typeface="メイリオ"/>
+                <a:ea typeface="メイリオ"/>
+                <a:cs typeface="メイリオ"/>
+              </a:endParaRPr>
+            </a:p>
+          </p:txBody>
+        </p:sp>
+        <p:sp>
+          <p:nvSpPr>
+            <p:cNvPr id="15" name="テキスト ボックス 14"/>
+            <p:cNvSpPr txBox="1"/>
+            <p:nvPr/>
+          </p:nvSpPr>
+          <p:spPr>
+            <a:xfrm>
+              <a:off x="2579850" y="2326727"/>
               <a:ext cx="1338828" cy="369332"/>
             </a:xfrm>
             <a:prstGeom prst="rect">
@@ -4303,12 +5119,61 @@
             <a:lstStyle/>
             <a:p>
               <a:r>
-                <a:rPr lang="en-US" altLang="en-US" dirty="0" smtClean="0">
+                <a:rPr lang="ja-JP" altLang="en-US" dirty="0" smtClean="0">
                   <a:latin typeface="メイリオ"/>
                   <a:ea typeface="メイリオ"/>
                   <a:cs typeface="メイリオ"/>
                 </a:rPr>
-                <a:t>テーブル</a:t>
+                <a:t>カテゴリ</a:t>
+              </a:r>
+              <a:r>
+                <a:rPr kumimoji="1" lang="ja-JP" altLang="en-US" dirty="0" smtClean="0">
+                  <a:latin typeface="メイリオ"/>
+                  <a:ea typeface="メイリオ"/>
+                  <a:cs typeface="メイリオ"/>
+                </a:rPr>
+                <a:t>：</a:t>
+              </a:r>
+              <a:endParaRPr kumimoji="1" lang="ja-JP" altLang="en-US" dirty="0">
+                <a:latin typeface="メイリオ"/>
+                <a:ea typeface="メイリオ"/>
+                <a:cs typeface="メイリオ"/>
+              </a:endParaRPr>
+            </a:p>
+          </p:txBody>
+        </p:sp>
+        <p:sp>
+          <p:nvSpPr>
+            <p:cNvPr id="16" name="テキスト ボックス 15"/>
+            <p:cNvSpPr txBox="1"/>
+            <p:nvPr/>
+          </p:nvSpPr>
+          <p:spPr>
+            <a:xfrm>
+              <a:off x="3041515" y="2842117"/>
+              <a:ext cx="877163" cy="369332"/>
+            </a:xfrm>
+            <a:prstGeom prst="rect">
+              <a:avLst/>
+            </a:prstGeom>
+            <a:noFill/>
+            <a:ln>
+              <a:noFill/>
+            </a:ln>
+          </p:spPr>
+          <p:txBody>
+            <a:bodyPr wrap="none" rtlCol="0">
+              <a:spAutoFit/>
+            </a:bodyPr>
+            <a:lstStyle/>
+            <a:p>
+              <a:r>
+                <a:rPr lang="ja-JP" altLang="en-US" dirty="0" smtClean="0">
+                  <a:latin typeface="メイリオ"/>
+                  <a:ea typeface="メイリオ"/>
+                  <a:cs typeface="メイリオ"/>
+                </a:rPr>
+                <a:t>金額</a:t>
               </a:r>
               <a:r>
                 <a:rPr kumimoji="1" lang="ja-JP" altLang="en-US" dirty="0" smtClean="0">
@@ -4461,7 +5326,7 @@
           <p:spPr>
             <a:xfrm>
               <a:off x="3918678" y="1295947"/>
-              <a:ext cx="2344428" cy="369332"/>
+              <a:ext cx="1935547" cy="369332"/>
             </a:xfrm>
             <a:prstGeom prst="rect">
               <a:avLst/>
@@ -4510,7 +5375,7 @@
           <p:spPr>
             <a:xfrm>
               <a:off x="3918678" y="1814570"/>
-              <a:ext cx="2344428" cy="369332"/>
+              <a:ext cx="1935547" cy="369332"/>
             </a:xfrm>
             <a:prstGeom prst="rect">
               <a:avLst/>
@@ -4559,7 +5424,7 @@
           <p:spPr>
             <a:xfrm>
               <a:off x="3918678" y="2842117"/>
-              <a:ext cx="2344428" cy="369332"/>
+              <a:ext cx="1935547" cy="369332"/>
             </a:xfrm>
             <a:prstGeom prst="rect">
               <a:avLst/>
@@ -4608,7 +5473,7 @@
           <p:spPr>
             <a:xfrm>
               <a:off x="3918678" y="2326727"/>
-              <a:ext cx="2344428" cy="369332"/>
+              <a:ext cx="1935547" cy="369332"/>
             </a:xfrm>
             <a:prstGeom prst="rect">
               <a:avLst/>
@@ -4656,7 +5521,7 @@
           </p:nvSpPr>
           <p:spPr>
             <a:xfrm>
-              <a:off x="4169599" y="3464224"/>
+              <a:off x="3635449" y="3464224"/>
               <a:ext cx="163286" cy="179456"/>
             </a:xfrm>
             <a:prstGeom prst="ellipse">
@@ -4707,7 +5572,7 @@
           </p:nvSpPr>
           <p:spPr>
             <a:xfrm>
-              <a:off x="4348521" y="3370783"/>
+              <a:off x="3814371" y="3370783"/>
               <a:ext cx="646331" cy="369332"/>
             </a:xfrm>
             <a:prstGeom prst="rect">
@@ -4748,7 +5613,7 @@
           </p:nvSpPr>
           <p:spPr>
             <a:xfrm>
-              <a:off x="5064150" y="3467034"/>
+              <a:off x="4530000" y="3467034"/>
               <a:ext cx="163286" cy="179456"/>
             </a:xfrm>
             <a:prstGeom prst="ellipse">
@@ -4799,7 +5664,7 @@
           </p:nvSpPr>
           <p:spPr>
             <a:xfrm>
-              <a:off x="5243072" y="3360225"/>
+              <a:off x="4708922" y="3360225"/>
               <a:ext cx="646331" cy="369332"/>
             </a:xfrm>
             <a:prstGeom prst="rect">
@@ -4833,10 +5698,237 @@
           </p:txBody>
         </p:sp>
       </p:grpSp>
+      <p:sp>
+        <p:nvSpPr>
+          <p:cNvPr id="3" name="星 7 2"/>
+          <p:cNvSpPr/>
+          <p:nvPr/>
+        </p:nvSpPr>
+        <p:spPr>
+          <a:xfrm>
+            <a:off x="6029729" y="1400682"/>
+            <a:ext cx="178043" cy="154313"/>
+          </a:xfrm>
+          <a:prstGeom prst="star7">
+            <a:avLst/>
+          </a:prstGeom>
+          <a:solidFill>
+            <a:srgbClr val="FF0000"/>
+          </a:solidFill>
+          <a:ln>
+            <a:solidFill>
+              <a:srgbClr val="FF0000"/>
+            </a:solidFill>
+          </a:ln>
+          <a:effectLst/>
+        </p:spPr>
+        <p:style>
+          <a:lnRef idx="1">
+            <a:schemeClr val="accent1"/>
+          </a:lnRef>
+          <a:fillRef idx="3">
+            <a:schemeClr val="accent1"/>
+          </a:fillRef>
+          <a:effectRef idx="2">
+            <a:schemeClr val="accent1"/>
+          </a:effectRef>
+          <a:fontRef idx="minor">
+            <a:schemeClr val="lt1"/>
+          </a:fontRef>
+        </p:style>
+        <p:txBody>
+          <a:bodyPr rtlCol="0" anchor="ctr"/>
+          <a:lstStyle/>
+          <a:p>
+            <a:pPr algn="ctr"/>
+            <a:endParaRPr kumimoji="1" lang="ja-JP" altLang="en-US"/>
+          </a:p>
+        </p:txBody>
+      </p:sp>
+      <p:sp>
+        <p:nvSpPr>
+          <p:cNvPr id="28" name="星 7 27"/>
+          <p:cNvSpPr/>
+          <p:nvPr/>
+        </p:nvSpPr>
+        <p:spPr>
+          <a:xfrm>
+            <a:off x="6029729" y="1924854"/>
+            <a:ext cx="178043" cy="154313"/>
+          </a:xfrm>
+          <a:prstGeom prst="star7">
+            <a:avLst/>
+          </a:prstGeom>
+          <a:solidFill>
+            <a:srgbClr val="FF0000"/>
+          </a:solidFill>
+          <a:ln>
+            <a:solidFill>
+              <a:srgbClr val="FF0000"/>
+            </a:solidFill>
+          </a:ln>
+          <a:effectLst/>
+        </p:spPr>
+        <p:style>
+          <a:lnRef idx="1">
+            <a:schemeClr val="accent1"/>
+          </a:lnRef>
+          <a:fillRef idx="3">
+            <a:schemeClr val="accent1"/>
+          </a:fillRef>
+          <a:effectRef idx="2">
+            <a:schemeClr val="accent1"/>
+          </a:effectRef>
+          <a:fontRef idx="minor">
+            <a:schemeClr val="lt1"/>
+          </a:fontRef>
+        </p:style>
+        <p:txBody>
+          <a:bodyPr rtlCol="0" anchor="ctr"/>
+          <a:lstStyle/>
+          <a:p>
+            <a:pPr algn="ctr"/>
+            <a:endParaRPr kumimoji="1" lang="ja-JP" altLang="en-US"/>
+          </a:p>
+        </p:txBody>
+      </p:sp>
+      <p:sp>
+        <p:nvSpPr>
+          <p:cNvPr id="6" name="円形吹き出し 5"/>
+          <p:cNvSpPr/>
+          <p:nvPr/>
+        </p:nvSpPr>
+        <p:spPr>
+          <a:xfrm>
+            <a:off x="6207771" y="2338597"/>
+            <a:ext cx="2409517" cy="872852"/>
+          </a:xfrm>
+          <a:prstGeom prst="wedgeEllipseCallout">
+            <a:avLst>
+              <a:gd name="adj1" fmla="val -47434"/>
+              <a:gd name="adj2" fmla="val -62691"/>
+            </a:avLst>
+          </a:prstGeom>
+          <a:solidFill>
+            <a:schemeClr val="bg1"/>
+          </a:solidFill>
+          <a:ln w="19050">
+            <a:solidFill>
+              <a:srgbClr val="008000"/>
+            </a:solidFill>
+          </a:ln>
+        </p:spPr>
+        <p:style>
+          <a:lnRef idx="1">
+            <a:schemeClr val="accent1"/>
+          </a:lnRef>
+          <a:fillRef idx="3">
+            <a:schemeClr val="accent1"/>
+          </a:fillRef>
+          <a:effectRef idx="2">
+            <a:schemeClr val="accent1"/>
+          </a:effectRef>
+          <a:fontRef idx="minor">
+            <a:schemeClr val="lt1"/>
+          </a:fontRef>
+        </p:style>
+        <p:txBody>
+          <a:bodyPr rtlCol="0" anchor="ctr"/>
+          <a:lstStyle/>
+          <a:p>
+            <a:pPr algn="ctr"/>
+            <a:endParaRPr kumimoji="1" lang="ja-JP" altLang="en-US" sz="1400" dirty="0">
+              <a:solidFill>
+                <a:schemeClr val="tx1"/>
+              </a:solidFill>
+              <a:latin typeface="メイリオ"/>
+              <a:ea typeface="メイリオ"/>
+              <a:cs typeface="メイリオ"/>
+            </a:endParaRPr>
+          </a:p>
+        </p:txBody>
+      </p:sp>
+      <p:sp>
+        <p:nvSpPr>
+          <p:cNvPr id="7" name="テキスト ボックス 6"/>
+          <p:cNvSpPr txBox="1"/>
+          <p:nvPr/>
+        </p:nvSpPr>
+        <p:spPr>
+          <a:xfrm>
+            <a:off x="6530474" y="2542170"/>
+            <a:ext cx="1800493" cy="523220"/>
+          </a:xfrm>
+          <a:prstGeom prst="rect">
+            <a:avLst/>
+          </a:prstGeom>
+          <a:noFill/>
+        </p:spPr>
+        <p:txBody>
+          <a:bodyPr wrap="none" rtlCol="0">
+            <a:spAutoFit/>
+          </a:bodyPr>
+          <a:lstStyle/>
+          <a:p>
+            <a:r>
+              <a:rPr lang="ja-JP" altLang="en-US" sz="1400" dirty="0">
+                <a:latin typeface="メイリオ"/>
+                <a:ea typeface="メイリオ"/>
+                <a:cs typeface="メイリオ"/>
+              </a:rPr>
+              <a:t>入力が不正な項目</a:t>
+            </a:r>
+            <a:r>
+              <a:rPr lang="ja-JP" altLang="en-US" sz="1400" dirty="0" smtClean="0">
+                <a:latin typeface="メイリオ"/>
+                <a:ea typeface="メイリオ"/>
+                <a:cs typeface="メイリオ"/>
+              </a:rPr>
+              <a:t>に</a:t>
+            </a:r>
+            <a:endParaRPr lang="en-US" altLang="ja-JP" sz="1400" dirty="0" smtClean="0">
+              <a:latin typeface="メイリオ"/>
+              <a:ea typeface="メイリオ"/>
+              <a:cs typeface="メイリオ"/>
+            </a:endParaRPr>
+          </a:p>
+          <a:p>
+            <a:r>
+              <a:rPr lang="ja-JP" altLang="en-US" sz="1400" dirty="0" smtClean="0">
+                <a:latin typeface="メイリオ"/>
+                <a:ea typeface="メイリオ"/>
+                <a:cs typeface="メイリオ"/>
+              </a:rPr>
+              <a:t>マーク</a:t>
+            </a:r>
+            <a:r>
+              <a:rPr lang="ja-JP" altLang="en-US" sz="1400" dirty="0">
+                <a:latin typeface="メイリオ"/>
+                <a:ea typeface="メイリオ"/>
+                <a:cs typeface="メイリオ"/>
+              </a:rPr>
+              <a:t>が表示</a:t>
+            </a:r>
+            <a:r>
+              <a:rPr lang="ja-JP" altLang="en-US" sz="1400" dirty="0" smtClean="0">
+                <a:latin typeface="メイリオ"/>
+                <a:ea typeface="メイリオ"/>
+                <a:cs typeface="メイリオ"/>
+              </a:rPr>
+              <a:t>される</a:t>
+            </a:r>
+            <a:endParaRPr lang="ja-JP" altLang="en-US" sz="1400" dirty="0">
+              <a:latin typeface="メイリオ"/>
+              <a:ea typeface="メイリオ"/>
+              <a:cs typeface="メイリオ"/>
+            </a:endParaRPr>
+          </a:p>
+        </p:txBody>
+      </p:sp>
     </p:spTree>
     <p:extLst>
       <p:ext uri="{BB962C8B-B14F-4D97-AF65-F5344CB8AC3E}">
-        <p14:creationId xmlns:p14="http://schemas.microsoft.com/office/powerpoint/2010/main" val="1574216287"/>
+        <p14:creationId xmlns:p14="http://schemas.microsoft.com/office/powerpoint/2010/main" val="110650986"/>
       </p:ext>
     </p:extLst>
   </p:cSld>

</xml_diff>